<commit_message>
Updated packaging resources & fixed javafx versions
</commit_message>
<xml_diff>
--- a/erb_supporting_docs/Packaging_Resources/lib/ERB/Projects/Explore/Goals/Default_Goal/Supporting_DOC/Indicator_Card_Template.pptx
+++ b/erb_supporting_docs/Packaging_Resources/lib/ERB/Projects/Explore/Goals/Default_Goal/Supporting_DOC/Indicator_Card_Template.pptx
@@ -2,18 +2,18 @@
 <file path=ppt/presentation.xml><?xml version="1.0" encoding="utf-8"?>
 <p:presentation xmlns:a="http://schemas.openxmlformats.org/drawingml/2006/main" xmlns:r="http://schemas.openxmlformats.org/officeDocument/2006/relationships" xmlns:p="http://schemas.openxmlformats.org/presentationml/2006/main" saveSubsetFonts="1">
   <p:sldMasterIdLst>
-    <p:sldMasterId id="2147483648" r:id="rId5"/>
+    <p:sldMasterId id="2147483648" r:id="rId4"/>
   </p:sldMasterIdLst>
   <p:notesMasterIdLst>
-    <p:notesMasterId r:id="rId12"/>
+    <p:notesMasterId r:id="rId11"/>
   </p:notesMasterIdLst>
   <p:sldIdLst>
-    <p:sldId id="267" r:id="rId6"/>
-    <p:sldId id="261" r:id="rId7"/>
-    <p:sldId id="260" r:id="rId8"/>
-    <p:sldId id="262" r:id="rId9"/>
-    <p:sldId id="259" r:id="rId10"/>
-    <p:sldId id="264" r:id="rId11"/>
+    <p:sldId id="267" r:id="rId5"/>
+    <p:sldId id="261" r:id="rId6"/>
+    <p:sldId id="260" r:id="rId7"/>
+    <p:sldId id="262" r:id="rId8"/>
+    <p:sldId id="259" r:id="rId9"/>
+    <p:sldId id="264" r:id="rId10"/>
   </p:sldIdLst>
   <p:sldSz cx="12192000" cy="6858000"/>
   <p:notesSz cx="6858000" cy="9144000"/>
@@ -126,249 +126,8 @@
 </p188:authorLst>
 </file>
 
-<file path=ppt/revisionInfo.xml><?xml version="1.0" encoding="utf-8"?>
-<p1510:revInfo xmlns:a="http://schemas.openxmlformats.org/drawingml/2006/main" xmlns:r="http://schemas.openxmlformats.org/officeDocument/2006/relationships" xmlns:p1510="http://schemas.microsoft.com/office/powerpoint/2015/10/main">
-  <p1510:revLst>
-    <p1510:client id="{003A89AD-F3E6-241F-AB04-42E60A029CD3}" v="599" dt="2023-04-12T16:44:50.729"/>
-    <p1510:client id="{632F3DEB-3C4F-DC12-C904-B8389F019239}" v="1471" dt="2023-04-12T16:10:31.966"/>
-    <p1510:client id="{9D2B54E9-2AB2-4536-8C94-4FF25EC11963}" v="1934" vWet="1938" dt="2023-04-12T15:48:48.458"/>
-    <p1510:client id="{AAB842FB-4B70-408E-96D7-FB47D7CAC5A4}" v="2" dt="2023-04-12T15:43:19.539"/>
-    <p1510:client id="{AC588CDA-5816-5958-4E83-ABAB33815F28}" v="2859" dt="2023-04-11T16:57:36.370"/>
-    <p1510:client id="{BCF4F10D-1701-433C-8F39-6EAF882CAC0B}" v="5" dt="2023-04-12T13:00:33.593"/>
-    <p1510:client id="{E666E214-8DBF-4FC1-8652-30E9224AA5F4}" v="462" dt="2023-04-12T15:36:20.183"/>
-    <p1510:client id="{ED08E105-D996-7BC6-595E-6ECE20BE6630}" v="388" dt="2023-04-11T16:55:24.762"/>
-  </p1510:revLst>
-</p1510:revInfo>
-</file>
-
 <file path=ppt/changesInfos/changesInfo1.xml><?xml version="1.0" encoding="utf-8"?>
 <pc:chgInfo xmlns:a="http://schemas.openxmlformats.org/drawingml/2006/main" xmlns:r="http://schemas.openxmlformats.org/officeDocument/2006/relationships" xmlns:ac="http://schemas.microsoft.com/office/drawing/2013/main/command" xmlns:pc="http://schemas.microsoft.com/office/powerpoint/2013/main/command">
-  <pc:docChgLst>
-    <pc:chgData name="Varner, Paige (she/her/hers)" userId="S::varner.paige@epa.gov::fc0f6d83-b290-4717-9f0d-95009db32cbd" providerId="AD" clId="Web-{ED08E105-D996-7BC6-595E-6ECE20BE6630}"/>
-    <pc:docChg chg="addSld modSld sldOrd">
-      <pc:chgData name="Varner, Paige (she/her/hers)" userId="S::varner.paige@epa.gov::fc0f6d83-b290-4717-9f0d-95009db32cbd" providerId="AD" clId="Web-{ED08E105-D996-7BC6-595E-6ECE20BE6630}" dt="2023-04-11T16:55:24.762" v="209" actId="1076"/>
-      <pc:docMkLst>
-        <pc:docMk/>
-      </pc:docMkLst>
-      <pc:sldChg chg="addSp modSp mod setBg">
-        <pc:chgData name="Varner, Paige (she/her/hers)" userId="S::varner.paige@epa.gov::fc0f6d83-b290-4717-9f0d-95009db32cbd" providerId="AD" clId="Web-{ED08E105-D996-7BC6-595E-6ECE20BE6630}" dt="2023-04-11T15:26:59.240" v="6" actId="1076"/>
-        <pc:sldMkLst>
-          <pc:docMk/>
-          <pc:sldMk cId="3145412834" sldId="256"/>
-        </pc:sldMkLst>
-        <pc:spChg chg="add">
-          <ac:chgData name="Varner, Paige (she/her/hers)" userId="S::varner.paige@epa.gov::fc0f6d83-b290-4717-9f0d-95009db32cbd" providerId="AD" clId="Web-{ED08E105-D996-7BC6-595E-6ECE20BE6630}" dt="2023-04-11T15:25:49.974" v="1"/>
-          <ac:spMkLst>
-            <pc:docMk/>
-            <pc:sldMk cId="3145412834" sldId="256"/>
-            <ac:spMk id="9" creationId="{42A4FC2C-047E-45A5-965D-8E1E3BF09BC6}"/>
-          </ac:spMkLst>
-        </pc:spChg>
-        <pc:picChg chg="add mod modCrop">
-          <ac:chgData name="Varner, Paige (she/her/hers)" userId="S::varner.paige@epa.gov::fc0f6d83-b290-4717-9f0d-95009db32cbd" providerId="AD" clId="Web-{ED08E105-D996-7BC6-595E-6ECE20BE6630}" dt="2023-04-11T15:26:59.240" v="6" actId="1076"/>
-          <ac:picMkLst>
-            <pc:docMk/>
-            <pc:sldMk cId="3145412834" sldId="256"/>
-            <ac:picMk id="4" creationId="{C3277DBE-73E6-5781-4B8B-6E6B3551EEEB}"/>
-          </ac:picMkLst>
-        </pc:picChg>
-      </pc:sldChg>
-      <pc:sldChg chg="modSp new">
-        <pc:chgData name="Varner, Paige (she/her/hers)" userId="S::varner.paige@epa.gov::fc0f6d83-b290-4717-9f0d-95009db32cbd" providerId="AD" clId="Web-{ED08E105-D996-7BC6-595E-6ECE20BE6630}" dt="2023-04-11T16:44:04.377" v="95" actId="20577"/>
-        <pc:sldMkLst>
-          <pc:docMk/>
-          <pc:sldMk cId="2637366253" sldId="257"/>
-        </pc:sldMkLst>
-        <pc:spChg chg="mod">
-          <ac:chgData name="Varner, Paige (she/her/hers)" userId="S::varner.paige@epa.gov::fc0f6d83-b290-4717-9f0d-95009db32cbd" providerId="AD" clId="Web-{ED08E105-D996-7BC6-595E-6ECE20BE6630}" dt="2023-04-11T16:43:55.595" v="82" actId="20577"/>
-          <ac:spMkLst>
-            <pc:docMk/>
-            <pc:sldMk cId="2637366253" sldId="257"/>
-            <ac:spMk id="4" creationId="{6774AB7A-3034-44B5-8BBD-58941BACFBE9}"/>
-          </ac:spMkLst>
-        </pc:spChg>
-        <pc:spChg chg="mod">
-          <ac:chgData name="Varner, Paige (she/her/hers)" userId="S::varner.paige@epa.gov::fc0f6d83-b290-4717-9f0d-95009db32cbd" providerId="AD" clId="Web-{ED08E105-D996-7BC6-595E-6ECE20BE6630}" dt="2023-04-11T16:44:04.377" v="95" actId="20577"/>
-          <ac:spMkLst>
-            <pc:docMk/>
-            <pc:sldMk cId="2637366253" sldId="257"/>
-            <ac:spMk id="5" creationId="{479FD662-7FA9-1241-E357-1CD586678554}"/>
-          </ac:spMkLst>
-        </pc:spChg>
-      </pc:sldChg>
-      <pc:sldChg chg="modSp">
-        <pc:chgData name="Varner, Paige (she/her/hers)" userId="S::varner.paige@epa.gov::fc0f6d83-b290-4717-9f0d-95009db32cbd" providerId="AD" clId="Web-{ED08E105-D996-7BC6-595E-6ECE20BE6630}" dt="2023-04-11T15:41:08.612" v="30" actId="20577"/>
-        <pc:sldMkLst>
-          <pc:docMk/>
-          <pc:sldMk cId="3419876165" sldId="258"/>
-        </pc:sldMkLst>
-        <pc:spChg chg="mod">
-          <ac:chgData name="Varner, Paige (she/her/hers)" userId="S::varner.paige@epa.gov::fc0f6d83-b290-4717-9f0d-95009db32cbd" providerId="AD" clId="Web-{ED08E105-D996-7BC6-595E-6ECE20BE6630}" dt="2023-04-11T15:41:08.612" v="30" actId="20577"/>
-          <ac:spMkLst>
-            <pc:docMk/>
-            <pc:sldMk cId="3419876165" sldId="258"/>
-            <ac:spMk id="4" creationId="{6774AB7A-3034-44B5-8BBD-58941BACFBE9}"/>
-          </ac:spMkLst>
-        </pc:spChg>
-        <pc:spChg chg="mod">
-          <ac:chgData name="Varner, Paige (she/her/hers)" userId="S::varner.paige@epa.gov::fc0f6d83-b290-4717-9f0d-95009db32cbd" providerId="AD" clId="Web-{ED08E105-D996-7BC6-595E-6ECE20BE6630}" dt="2023-04-11T15:40:57.830" v="28" actId="20577"/>
-          <ac:spMkLst>
-            <pc:docMk/>
-            <pc:sldMk cId="3419876165" sldId="258"/>
-            <ac:spMk id="5" creationId="{479FD662-7FA9-1241-E357-1CD586678554}"/>
-          </ac:spMkLst>
-        </pc:spChg>
-      </pc:sldChg>
-      <pc:sldChg chg="modSp">
-        <pc:chgData name="Varner, Paige (she/her/hers)" userId="S::varner.paige@epa.gov::fc0f6d83-b290-4717-9f0d-95009db32cbd" providerId="AD" clId="Web-{ED08E105-D996-7BC6-595E-6ECE20BE6630}" dt="2023-04-11T16:40:24.608" v="70" actId="20577"/>
-        <pc:sldMkLst>
-          <pc:docMk/>
-          <pc:sldMk cId="3989611827" sldId="259"/>
-        </pc:sldMkLst>
-        <pc:spChg chg="mod">
-          <ac:chgData name="Varner, Paige (she/her/hers)" userId="S::varner.paige@epa.gov::fc0f6d83-b290-4717-9f0d-95009db32cbd" providerId="AD" clId="Web-{ED08E105-D996-7BC6-595E-6ECE20BE6630}" dt="2023-04-11T16:35:26.291" v="49"/>
-          <ac:spMkLst>
-            <pc:docMk/>
-            <pc:sldMk cId="3989611827" sldId="259"/>
-            <ac:spMk id="2" creationId="{6427F933-EFFA-5187-6A06-328B41BF4BE4}"/>
-          </ac:spMkLst>
-        </pc:spChg>
-        <pc:spChg chg="mod">
-          <ac:chgData name="Varner, Paige (she/her/hers)" userId="S::varner.paige@epa.gov::fc0f6d83-b290-4717-9f0d-95009db32cbd" providerId="AD" clId="Web-{ED08E105-D996-7BC6-595E-6ECE20BE6630}" dt="2023-04-11T16:35:29.697" v="50"/>
-          <ac:spMkLst>
-            <pc:docMk/>
-            <pc:sldMk cId="3989611827" sldId="259"/>
-            <ac:spMk id="3" creationId="{DAC9B4E7-F773-02AC-A796-357838431F91}"/>
-          </ac:spMkLst>
-        </pc:spChg>
-        <pc:spChg chg="mod">
-          <ac:chgData name="Varner, Paige (she/her/hers)" userId="S::varner.paige@epa.gov::fc0f6d83-b290-4717-9f0d-95009db32cbd" providerId="AD" clId="Web-{ED08E105-D996-7BC6-595E-6ECE20BE6630}" dt="2023-04-11T16:40:24.608" v="70" actId="20577"/>
-          <ac:spMkLst>
-            <pc:docMk/>
-            <pc:sldMk cId="3989611827" sldId="259"/>
-            <ac:spMk id="4" creationId="{6774AB7A-3034-44B5-8BBD-58941BACFBE9}"/>
-          </ac:spMkLst>
-        </pc:spChg>
-        <pc:spChg chg="mod">
-          <ac:chgData name="Varner, Paige (she/her/hers)" userId="S::varner.paige@epa.gov::fc0f6d83-b290-4717-9f0d-95009db32cbd" providerId="AD" clId="Web-{ED08E105-D996-7BC6-595E-6ECE20BE6630}" dt="2023-04-11T16:38:41.997" v="67" actId="20577"/>
-          <ac:spMkLst>
-            <pc:docMk/>
-            <pc:sldMk cId="3989611827" sldId="259"/>
-            <ac:spMk id="5" creationId="{479FD662-7FA9-1241-E357-1CD586678554}"/>
-          </ac:spMkLst>
-        </pc:spChg>
-      </pc:sldChg>
-      <pc:sldChg chg="addSp modSp">
-        <pc:chgData name="Varner, Paige (she/her/hers)" userId="S::varner.paige@epa.gov::fc0f6d83-b290-4717-9f0d-95009db32cbd" providerId="AD" clId="Web-{ED08E105-D996-7BC6-595E-6ECE20BE6630}" dt="2023-04-11T16:51:19.915" v="200"/>
-        <pc:sldMkLst>
-          <pc:docMk/>
-          <pc:sldMk cId="1226469851" sldId="260"/>
-        </pc:sldMkLst>
-        <pc:spChg chg="mod">
-          <ac:chgData name="Varner, Paige (she/her/hers)" userId="S::varner.paige@epa.gov::fc0f6d83-b290-4717-9f0d-95009db32cbd" providerId="AD" clId="Web-{ED08E105-D996-7BC6-595E-6ECE20BE6630}" dt="2023-04-11T16:49:56.070" v="145"/>
-          <ac:spMkLst>
-            <pc:docMk/>
-            <pc:sldMk cId="1226469851" sldId="260"/>
-            <ac:spMk id="2" creationId="{6427F933-EFFA-5187-6A06-328B41BF4BE4}"/>
-          </ac:spMkLst>
-        </pc:spChg>
-        <pc:spChg chg="mod">
-          <ac:chgData name="Varner, Paige (she/her/hers)" userId="S::varner.paige@epa.gov::fc0f6d83-b290-4717-9f0d-95009db32cbd" providerId="AD" clId="Web-{ED08E105-D996-7BC6-595E-6ECE20BE6630}" dt="2023-04-11T16:49:58.507" v="146"/>
-          <ac:spMkLst>
-            <pc:docMk/>
-            <pc:sldMk cId="1226469851" sldId="260"/>
-            <ac:spMk id="3" creationId="{DAC9B4E7-F773-02AC-A796-357838431F91}"/>
-          </ac:spMkLst>
-        </pc:spChg>
-        <pc:spChg chg="mod">
-          <ac:chgData name="Varner, Paige (she/her/hers)" userId="S::varner.paige@epa.gov::fc0f6d83-b290-4717-9f0d-95009db32cbd" providerId="AD" clId="Web-{ED08E105-D996-7BC6-595E-6ECE20BE6630}" dt="2023-04-11T16:49:09.256" v="144" actId="20577"/>
-          <ac:spMkLst>
-            <pc:docMk/>
-            <pc:sldMk cId="1226469851" sldId="260"/>
-            <ac:spMk id="4" creationId="{6774AB7A-3034-44B5-8BBD-58941BACFBE9}"/>
-          </ac:spMkLst>
-        </pc:spChg>
-        <pc:spChg chg="mod">
-          <ac:chgData name="Varner, Paige (she/her/hers)" userId="S::varner.paige@epa.gov::fc0f6d83-b290-4717-9f0d-95009db32cbd" providerId="AD" clId="Web-{ED08E105-D996-7BC6-595E-6ECE20BE6630}" dt="2023-04-11T16:48:42.397" v="113" actId="20577"/>
-          <ac:spMkLst>
-            <pc:docMk/>
-            <pc:sldMk cId="1226469851" sldId="260"/>
-            <ac:spMk id="5" creationId="{479FD662-7FA9-1241-E357-1CD586678554}"/>
-          </ac:spMkLst>
-        </pc:spChg>
-        <pc:spChg chg="add mod">
-          <ac:chgData name="Varner, Paige (she/her/hers)" userId="S::varner.paige@epa.gov::fc0f6d83-b290-4717-9f0d-95009db32cbd" providerId="AD" clId="Web-{ED08E105-D996-7BC6-595E-6ECE20BE6630}" dt="2023-04-11T16:51:19.915" v="200"/>
-          <ac:spMkLst>
-            <pc:docMk/>
-            <pc:sldMk cId="1226469851" sldId="260"/>
-            <ac:spMk id="12" creationId="{AA23B7E6-73AA-C926-F8C8-47839B07FAF7}"/>
-          </ac:spMkLst>
-        </pc:spChg>
-      </pc:sldChg>
-      <pc:sldChg chg="addSp delSp modSp ord">
-        <pc:chgData name="Varner, Paige (she/her/hers)" userId="S::varner.paige@epa.gov::fc0f6d83-b290-4717-9f0d-95009db32cbd" providerId="AD" clId="Web-{ED08E105-D996-7BC6-595E-6ECE20BE6630}" dt="2023-04-11T16:55:24.762" v="209" actId="1076"/>
-        <pc:sldMkLst>
-          <pc:docMk/>
-          <pc:sldMk cId="3243331262" sldId="261"/>
-        </pc:sldMkLst>
-        <pc:spChg chg="add mod">
-          <ac:chgData name="Varner, Paige (she/her/hers)" userId="S::varner.paige@epa.gov::fc0f6d83-b290-4717-9f0d-95009db32cbd" providerId="AD" clId="Web-{ED08E105-D996-7BC6-595E-6ECE20BE6630}" dt="2023-04-11T16:50:53.805" v="192" actId="14100"/>
-          <ac:spMkLst>
-            <pc:docMk/>
-            <pc:sldMk cId="3243331262" sldId="261"/>
-            <ac:spMk id="10" creationId="{5CE2C573-7270-5C96-F8CB-9B37D5E68572}"/>
-          </ac:spMkLst>
-        </pc:spChg>
-        <pc:picChg chg="del">
-          <ac:chgData name="Varner, Paige (she/her/hers)" userId="S::varner.paige@epa.gov::fc0f6d83-b290-4717-9f0d-95009db32cbd" providerId="AD" clId="Web-{ED08E105-D996-7BC6-595E-6ECE20BE6630}" dt="2023-04-11T16:54:39.027" v="205"/>
-          <ac:picMkLst>
-            <pc:docMk/>
-            <pc:sldMk cId="3243331262" sldId="261"/>
-            <ac:picMk id="8" creationId="{62A38EE5-B6F5-D8C4-0F85-75FC3F61DF4F}"/>
-          </ac:picMkLst>
-        </pc:picChg>
-        <pc:picChg chg="add mod">
-          <ac:chgData name="Varner, Paige (she/her/hers)" userId="S::varner.paige@epa.gov::fc0f6d83-b290-4717-9f0d-95009db32cbd" providerId="AD" clId="Web-{ED08E105-D996-7BC6-595E-6ECE20BE6630}" dt="2023-04-11T16:55:24.762" v="209" actId="1076"/>
-          <ac:picMkLst>
-            <pc:docMk/>
-            <pc:sldMk cId="3243331262" sldId="261"/>
-            <ac:picMk id="11" creationId="{B0ADD72F-D75F-F94E-08F0-1CC5231BFB3F}"/>
-          </ac:picMkLst>
-        </pc:picChg>
-      </pc:sldChg>
-      <pc:sldChg chg="addSp modSp">
-        <pc:chgData name="Varner, Paige (she/her/hers)" userId="S::varner.paige@epa.gov::fc0f6d83-b290-4717-9f0d-95009db32cbd" providerId="AD" clId="Web-{ED08E105-D996-7BC6-595E-6ECE20BE6630}" dt="2023-04-11T16:51:27.118" v="201"/>
-        <pc:sldMkLst>
-          <pc:docMk/>
-          <pc:sldMk cId="1997747637" sldId="262"/>
-        </pc:sldMkLst>
-        <pc:spChg chg="mod">
-          <ac:chgData name="Varner, Paige (she/her/hers)" userId="S::varner.paige@epa.gov::fc0f6d83-b290-4717-9f0d-95009db32cbd" providerId="AD" clId="Web-{ED08E105-D996-7BC6-595E-6ECE20BE6630}" dt="2023-04-11T16:51:09.133" v="198"/>
-          <ac:spMkLst>
-            <pc:docMk/>
-            <pc:sldMk cId="1997747637" sldId="262"/>
-            <ac:spMk id="2" creationId="{6427F933-EFFA-5187-6A06-328B41BF4BE4}"/>
-          </ac:spMkLst>
-        </pc:spChg>
-        <pc:spChg chg="mod">
-          <ac:chgData name="Varner, Paige (she/her/hers)" userId="S::varner.paige@epa.gov::fc0f6d83-b290-4717-9f0d-95009db32cbd" providerId="AD" clId="Web-{ED08E105-D996-7BC6-595E-6ECE20BE6630}" dt="2023-04-11T16:51:11.368" v="199"/>
-          <ac:spMkLst>
-            <pc:docMk/>
-            <pc:sldMk cId="1997747637" sldId="262"/>
-            <ac:spMk id="3" creationId="{DAC9B4E7-F773-02AC-A796-357838431F91}"/>
-          </ac:spMkLst>
-        </pc:spChg>
-        <pc:spChg chg="add mod">
-          <ac:chgData name="Varner, Paige (she/her/hers)" userId="S::varner.paige@epa.gov::fc0f6d83-b290-4717-9f0d-95009db32cbd" providerId="AD" clId="Web-{ED08E105-D996-7BC6-595E-6ECE20BE6630}" dt="2023-04-11T16:51:27.118" v="201"/>
-          <ac:spMkLst>
-            <pc:docMk/>
-            <pc:sldMk cId="1997747637" sldId="262"/>
-            <ac:spMk id="10" creationId="{389757B4-DDB7-938D-30F7-5784962CECB6}"/>
-          </ac:spMkLst>
-        </pc:spChg>
-      </pc:sldChg>
-    </pc:docChg>
-  </pc:docChgLst>
   <pc:docChgLst>
     <pc:chgData name="Matsler, Marissa (she/her/hers)" userId="1410ffa4-cd32-4727-bdae-74e62a85ae1d" providerId="ADAL" clId="{9D2B54E9-2AB2-4536-8C94-4FF25EC11963}"/>
     <pc:docChg chg="undo custSel addSld delSld modSld sldOrd">
@@ -826,24 +585,24 @@
     </pc:docChg>
   </pc:docChgLst>
   <pc:docChgLst>
-    <pc:chgData name="Varner, Paige (she/her/hers)" userId="S::varner.paige@epa.gov::fc0f6d83-b290-4717-9f0d-95009db32cbd" providerId="AD" clId="Web-{003A89AD-F3E6-241F-AB04-42E60A029CD3}"/>
+    <pc:chgData name="Fry, Meridith (she/her/hers)" userId="S::fry.meridith@epa.gov::744b0799-9c5f-4010-b84c-816c454cc486" providerId="AD" clId="Web-{BCF4F10D-1701-433C-8F39-6EAF882CAC0B}"/>
     <pc:docChg chg="modSld">
-      <pc:chgData name="Varner, Paige (she/her/hers)" userId="S::varner.paige@epa.gov::fc0f6d83-b290-4717-9f0d-95009db32cbd" providerId="AD" clId="Web-{003A89AD-F3E6-241F-AB04-42E60A029CD3}" dt="2023-04-12T16:44:50.729" v="290" actId="20577"/>
+      <pc:chgData name="Fry, Meridith (she/her/hers)" userId="S::fry.meridith@epa.gov::744b0799-9c5f-4010-b84c-816c454cc486" providerId="AD" clId="Web-{BCF4F10D-1701-433C-8F39-6EAF882CAC0B}" dt="2023-04-12T13:00:32.437" v="1" actId="20577"/>
       <pc:docMkLst>
         <pc:docMk/>
       </pc:docMkLst>
       <pc:sldChg chg="modSp">
-        <pc:chgData name="Varner, Paige (she/her/hers)" userId="S::varner.paige@epa.gov::fc0f6d83-b290-4717-9f0d-95009db32cbd" providerId="AD" clId="Web-{003A89AD-F3E6-241F-AB04-42E60A029CD3}" dt="2023-04-12T16:44:50.729" v="290" actId="20577"/>
+        <pc:chgData name="Fry, Meridith (she/her/hers)" userId="S::fry.meridith@epa.gov::744b0799-9c5f-4010-b84c-816c454cc486" providerId="AD" clId="Web-{BCF4F10D-1701-433C-8F39-6EAF882CAC0B}" dt="2023-04-12T13:00:32.437" v="1" actId="20577"/>
         <pc:sldMkLst>
           <pc:docMk/>
-          <pc:sldMk cId="3524633860" sldId="267"/>
+          <pc:sldMk cId="3989611827" sldId="259"/>
         </pc:sldMkLst>
         <pc:spChg chg="mod">
-          <ac:chgData name="Varner, Paige (she/her/hers)" userId="S::varner.paige@epa.gov::fc0f6d83-b290-4717-9f0d-95009db32cbd" providerId="AD" clId="Web-{003A89AD-F3E6-241F-AB04-42E60A029CD3}" dt="2023-04-12T16:44:50.729" v="290" actId="20577"/>
-          <ac:spMkLst>
-            <pc:docMk/>
-            <pc:sldMk cId="3524633860" sldId="267"/>
-            <ac:spMk id="4" creationId="{EA7FD89D-F11C-3331-50F1-55E61EDC50AA}"/>
+          <ac:chgData name="Fry, Meridith (she/her/hers)" userId="S::fry.meridith@epa.gov::744b0799-9c5f-4010-b84c-816c454cc486" providerId="AD" clId="Web-{BCF4F10D-1701-433C-8F39-6EAF882CAC0B}" dt="2023-04-12T13:00:32.437" v="1" actId="20577"/>
+          <ac:spMkLst>
+            <pc:docMk/>
+            <pc:sldMk cId="3989611827" sldId="259"/>
+            <ac:spMk id="4" creationId="{6774AB7A-3034-44B5-8BBD-58941BACFBE9}"/>
           </ac:spMkLst>
         </pc:spChg>
       </pc:sldChg>
@@ -1144,6 +903,456 @@
             <pc:docMk/>
             <pc:sldMk cId="1124510751" sldId="263"/>
             <ac:spMk id="11" creationId="{1BBCA1B9-3604-1E3D-6503-2B434E7364F1}"/>
+          </ac:spMkLst>
+        </pc:spChg>
+      </pc:sldChg>
+    </pc:docChg>
+  </pc:docChgLst>
+  <pc:docChgLst>
+    <pc:chgData name="Roemer, Kelli" userId="S::roemer.kelli@epa.gov::cdc1d093-60ef-47f5-9329-cda3558f2540" providerId="AD" clId="Web-{E666E214-8DBF-4FC1-8652-30E9224AA5F4}"/>
+    <pc:docChg chg="addSld delSld modSld">
+      <pc:chgData name="Roemer, Kelli" userId="S::roemer.kelli@epa.gov::cdc1d093-60ef-47f5-9329-cda3558f2540" providerId="AD" clId="Web-{E666E214-8DBF-4FC1-8652-30E9224AA5F4}" dt="2023-04-12T15:36:20.183" v="251" actId="20577"/>
+      <pc:docMkLst>
+        <pc:docMk/>
+      </pc:docMkLst>
+      <pc:sldChg chg="modSp">
+        <pc:chgData name="Roemer, Kelli" userId="S::roemer.kelli@epa.gov::cdc1d093-60ef-47f5-9329-cda3558f2540" providerId="AD" clId="Web-{E666E214-8DBF-4FC1-8652-30E9224AA5F4}" dt="2023-04-12T15:36:20.183" v="251" actId="20577"/>
+        <pc:sldMkLst>
+          <pc:docMk/>
+          <pc:sldMk cId="3989611827" sldId="259"/>
+        </pc:sldMkLst>
+        <pc:spChg chg="mod">
+          <ac:chgData name="Roemer, Kelli" userId="S::roemer.kelli@epa.gov::cdc1d093-60ef-47f5-9329-cda3558f2540" providerId="AD" clId="Web-{E666E214-8DBF-4FC1-8652-30E9224AA5F4}" dt="2023-04-12T15:36:20.183" v="251" actId="20577"/>
+          <ac:spMkLst>
+            <pc:docMk/>
+            <pc:sldMk cId="3989611827" sldId="259"/>
+            <ac:spMk id="13" creationId="{32F63358-C413-5F0C-AA2C-84B1790960E2}"/>
+          </ac:spMkLst>
+        </pc:spChg>
+      </pc:sldChg>
+      <pc:sldChg chg="addSp modSp">
+        <pc:chgData name="Roemer, Kelli" userId="S::roemer.kelli@epa.gov::cdc1d093-60ef-47f5-9329-cda3558f2540" providerId="AD" clId="Web-{E666E214-8DBF-4FC1-8652-30E9224AA5F4}" dt="2023-04-12T15:18:55.700" v="57" actId="14100"/>
+        <pc:sldMkLst>
+          <pc:docMk/>
+          <pc:sldMk cId="3402338812" sldId="264"/>
+        </pc:sldMkLst>
+        <pc:spChg chg="add mod">
+          <ac:chgData name="Roemer, Kelli" userId="S::roemer.kelli@epa.gov::cdc1d093-60ef-47f5-9329-cda3558f2540" providerId="AD" clId="Web-{E666E214-8DBF-4FC1-8652-30E9224AA5F4}" dt="2023-04-12T15:18:55.700" v="57" actId="14100"/>
+          <ac:spMkLst>
+            <pc:docMk/>
+            <pc:sldMk cId="3402338812" sldId="264"/>
+            <ac:spMk id="15" creationId="{CBEB9FD7-71D9-3E6D-AC9B-3D00553D039A}"/>
+          </ac:spMkLst>
+        </pc:spChg>
+      </pc:sldChg>
+      <pc:sldChg chg="addSp modSp">
+        <pc:chgData name="Roemer, Kelli" userId="S::roemer.kelli@epa.gov::cdc1d093-60ef-47f5-9329-cda3558f2540" providerId="AD" clId="Web-{E666E214-8DBF-4FC1-8652-30E9224AA5F4}" dt="2023-04-12T15:27:59.020" v="238" actId="20577"/>
+        <pc:sldMkLst>
+          <pc:docMk/>
+          <pc:sldMk cId="431036989" sldId="265"/>
+        </pc:sldMkLst>
+        <pc:spChg chg="mod">
+          <ac:chgData name="Roemer, Kelli" userId="S::roemer.kelli@epa.gov::cdc1d093-60ef-47f5-9329-cda3558f2540" providerId="AD" clId="Web-{E666E214-8DBF-4FC1-8652-30E9224AA5F4}" dt="2023-04-12T15:27:59.020" v="238" actId="20577"/>
+          <ac:spMkLst>
+            <pc:docMk/>
+            <pc:sldMk cId="431036989" sldId="265"/>
+            <ac:spMk id="15" creationId="{3DA06D0A-88ED-BBC7-5940-82343BD55444}"/>
+          </ac:spMkLst>
+        </pc:spChg>
+        <pc:cxnChg chg="add mod">
+          <ac:chgData name="Roemer, Kelli" userId="S::roemer.kelli@epa.gov::cdc1d093-60ef-47f5-9329-cda3558f2540" providerId="AD" clId="Web-{E666E214-8DBF-4FC1-8652-30E9224AA5F4}" dt="2023-04-12T15:26:09.034" v="177" actId="14100"/>
+          <ac:cxnSpMkLst>
+            <pc:docMk/>
+            <pc:sldMk cId="431036989" sldId="265"/>
+            <ac:cxnSpMk id="6" creationId="{1355C48F-E32E-39DE-93DD-7FEFC47F75CA}"/>
+          </ac:cxnSpMkLst>
+        </pc:cxnChg>
+        <pc:cxnChg chg="add mod">
+          <ac:chgData name="Roemer, Kelli" userId="S::roemer.kelli@epa.gov::cdc1d093-60ef-47f5-9329-cda3558f2540" providerId="AD" clId="Web-{E666E214-8DBF-4FC1-8652-30E9224AA5F4}" dt="2023-04-12T15:24:39.611" v="115" actId="14100"/>
+          <ac:cxnSpMkLst>
+            <pc:docMk/>
+            <pc:sldMk cId="431036989" sldId="265"/>
+            <ac:cxnSpMk id="7" creationId="{34A63D27-F8F9-1239-C667-6847C9FC9892}"/>
+          </ac:cxnSpMkLst>
+        </pc:cxnChg>
+      </pc:sldChg>
+      <pc:sldChg chg="delSp modSp add del replId">
+        <pc:chgData name="Roemer, Kelli" userId="S::roemer.kelli@epa.gov::cdc1d093-60ef-47f5-9329-cda3558f2540" providerId="AD" clId="Web-{E666E214-8DBF-4FC1-8652-30E9224AA5F4}" dt="2023-04-12T15:23:10.500" v="106"/>
+        <pc:sldMkLst>
+          <pc:docMk/>
+          <pc:sldMk cId="986803219" sldId="266"/>
+        </pc:sldMkLst>
+        <pc:spChg chg="mod">
+          <ac:chgData name="Roemer, Kelli" userId="S::roemer.kelli@epa.gov::cdc1d093-60ef-47f5-9329-cda3558f2540" providerId="AD" clId="Web-{E666E214-8DBF-4FC1-8652-30E9224AA5F4}" dt="2023-04-12T15:22:27.765" v="105" actId="20577"/>
+          <ac:spMkLst>
+            <pc:docMk/>
+            <pc:sldMk cId="986803219" sldId="266"/>
+            <ac:spMk id="4" creationId="{6774AB7A-3034-44B5-8BBD-58941BACFBE9}"/>
+          </ac:spMkLst>
+        </pc:spChg>
+        <pc:spChg chg="del">
+          <ac:chgData name="Roemer, Kelli" userId="S::roemer.kelli@epa.gov::cdc1d093-60ef-47f5-9329-cda3558f2540" providerId="AD" clId="Web-{E666E214-8DBF-4FC1-8652-30E9224AA5F4}" dt="2023-04-12T15:21:38.702" v="74"/>
+          <ac:spMkLst>
+            <pc:docMk/>
+            <pc:sldMk cId="986803219" sldId="266"/>
+            <ac:spMk id="9" creationId="{54FF9B3B-D48F-86CC-9B69-1201EE6DF0B4}"/>
+          </ac:spMkLst>
+        </pc:spChg>
+        <pc:picChg chg="mod">
+          <ac:chgData name="Roemer, Kelli" userId="S::roemer.kelli@epa.gov::cdc1d093-60ef-47f5-9329-cda3558f2540" providerId="AD" clId="Web-{E666E214-8DBF-4FC1-8652-30E9224AA5F4}" dt="2023-04-12T15:21:56.155" v="87" actId="1076"/>
+          <ac:picMkLst>
+            <pc:docMk/>
+            <pc:sldMk cId="986803219" sldId="266"/>
+            <ac:picMk id="8" creationId="{62A38EE5-B6F5-D8C4-0F85-75FC3F61DF4F}"/>
+          </ac:picMkLst>
+        </pc:picChg>
+      </pc:sldChg>
+    </pc:docChg>
+  </pc:docChgLst>
+  <pc:docChgLst>
+    <pc:chgData name="Varner, Paige (she/her/hers)" userId="S::varner.paige@epa.gov::fc0f6d83-b290-4717-9f0d-95009db32cbd" providerId="AD" clId="Web-{ED08E105-D996-7BC6-595E-6ECE20BE6630}"/>
+    <pc:docChg chg="addSld modSld sldOrd">
+      <pc:chgData name="Varner, Paige (she/her/hers)" userId="S::varner.paige@epa.gov::fc0f6d83-b290-4717-9f0d-95009db32cbd" providerId="AD" clId="Web-{ED08E105-D996-7BC6-595E-6ECE20BE6630}" dt="2023-04-11T16:55:24.762" v="209" actId="1076"/>
+      <pc:docMkLst>
+        <pc:docMk/>
+      </pc:docMkLst>
+      <pc:sldChg chg="addSp modSp mod setBg">
+        <pc:chgData name="Varner, Paige (she/her/hers)" userId="S::varner.paige@epa.gov::fc0f6d83-b290-4717-9f0d-95009db32cbd" providerId="AD" clId="Web-{ED08E105-D996-7BC6-595E-6ECE20BE6630}" dt="2023-04-11T15:26:59.240" v="6" actId="1076"/>
+        <pc:sldMkLst>
+          <pc:docMk/>
+          <pc:sldMk cId="3145412834" sldId="256"/>
+        </pc:sldMkLst>
+        <pc:spChg chg="add">
+          <ac:chgData name="Varner, Paige (she/her/hers)" userId="S::varner.paige@epa.gov::fc0f6d83-b290-4717-9f0d-95009db32cbd" providerId="AD" clId="Web-{ED08E105-D996-7BC6-595E-6ECE20BE6630}" dt="2023-04-11T15:25:49.974" v="1"/>
+          <ac:spMkLst>
+            <pc:docMk/>
+            <pc:sldMk cId="3145412834" sldId="256"/>
+            <ac:spMk id="9" creationId="{42A4FC2C-047E-45A5-965D-8E1E3BF09BC6}"/>
+          </ac:spMkLst>
+        </pc:spChg>
+        <pc:picChg chg="add mod modCrop">
+          <ac:chgData name="Varner, Paige (she/her/hers)" userId="S::varner.paige@epa.gov::fc0f6d83-b290-4717-9f0d-95009db32cbd" providerId="AD" clId="Web-{ED08E105-D996-7BC6-595E-6ECE20BE6630}" dt="2023-04-11T15:26:59.240" v="6" actId="1076"/>
+          <ac:picMkLst>
+            <pc:docMk/>
+            <pc:sldMk cId="3145412834" sldId="256"/>
+            <ac:picMk id="4" creationId="{C3277DBE-73E6-5781-4B8B-6E6B3551EEEB}"/>
+          </ac:picMkLst>
+        </pc:picChg>
+      </pc:sldChg>
+      <pc:sldChg chg="modSp new">
+        <pc:chgData name="Varner, Paige (she/her/hers)" userId="S::varner.paige@epa.gov::fc0f6d83-b290-4717-9f0d-95009db32cbd" providerId="AD" clId="Web-{ED08E105-D996-7BC6-595E-6ECE20BE6630}" dt="2023-04-11T16:44:04.377" v="95" actId="20577"/>
+        <pc:sldMkLst>
+          <pc:docMk/>
+          <pc:sldMk cId="2637366253" sldId="257"/>
+        </pc:sldMkLst>
+        <pc:spChg chg="mod">
+          <ac:chgData name="Varner, Paige (she/her/hers)" userId="S::varner.paige@epa.gov::fc0f6d83-b290-4717-9f0d-95009db32cbd" providerId="AD" clId="Web-{ED08E105-D996-7BC6-595E-6ECE20BE6630}" dt="2023-04-11T16:43:55.595" v="82" actId="20577"/>
+          <ac:spMkLst>
+            <pc:docMk/>
+            <pc:sldMk cId="2637366253" sldId="257"/>
+            <ac:spMk id="4" creationId="{6774AB7A-3034-44B5-8BBD-58941BACFBE9}"/>
+          </ac:spMkLst>
+        </pc:spChg>
+        <pc:spChg chg="mod">
+          <ac:chgData name="Varner, Paige (she/her/hers)" userId="S::varner.paige@epa.gov::fc0f6d83-b290-4717-9f0d-95009db32cbd" providerId="AD" clId="Web-{ED08E105-D996-7BC6-595E-6ECE20BE6630}" dt="2023-04-11T16:44:04.377" v="95" actId="20577"/>
+          <ac:spMkLst>
+            <pc:docMk/>
+            <pc:sldMk cId="2637366253" sldId="257"/>
+            <ac:spMk id="5" creationId="{479FD662-7FA9-1241-E357-1CD586678554}"/>
+          </ac:spMkLst>
+        </pc:spChg>
+      </pc:sldChg>
+      <pc:sldChg chg="modSp">
+        <pc:chgData name="Varner, Paige (she/her/hers)" userId="S::varner.paige@epa.gov::fc0f6d83-b290-4717-9f0d-95009db32cbd" providerId="AD" clId="Web-{ED08E105-D996-7BC6-595E-6ECE20BE6630}" dt="2023-04-11T15:41:08.612" v="30" actId="20577"/>
+        <pc:sldMkLst>
+          <pc:docMk/>
+          <pc:sldMk cId="3419876165" sldId="258"/>
+        </pc:sldMkLst>
+        <pc:spChg chg="mod">
+          <ac:chgData name="Varner, Paige (she/her/hers)" userId="S::varner.paige@epa.gov::fc0f6d83-b290-4717-9f0d-95009db32cbd" providerId="AD" clId="Web-{ED08E105-D996-7BC6-595E-6ECE20BE6630}" dt="2023-04-11T15:41:08.612" v="30" actId="20577"/>
+          <ac:spMkLst>
+            <pc:docMk/>
+            <pc:sldMk cId="3419876165" sldId="258"/>
+            <ac:spMk id="4" creationId="{6774AB7A-3034-44B5-8BBD-58941BACFBE9}"/>
+          </ac:spMkLst>
+        </pc:spChg>
+        <pc:spChg chg="mod">
+          <ac:chgData name="Varner, Paige (she/her/hers)" userId="S::varner.paige@epa.gov::fc0f6d83-b290-4717-9f0d-95009db32cbd" providerId="AD" clId="Web-{ED08E105-D996-7BC6-595E-6ECE20BE6630}" dt="2023-04-11T15:40:57.830" v="28" actId="20577"/>
+          <ac:spMkLst>
+            <pc:docMk/>
+            <pc:sldMk cId="3419876165" sldId="258"/>
+            <ac:spMk id="5" creationId="{479FD662-7FA9-1241-E357-1CD586678554}"/>
+          </ac:spMkLst>
+        </pc:spChg>
+      </pc:sldChg>
+      <pc:sldChg chg="modSp">
+        <pc:chgData name="Varner, Paige (she/her/hers)" userId="S::varner.paige@epa.gov::fc0f6d83-b290-4717-9f0d-95009db32cbd" providerId="AD" clId="Web-{ED08E105-D996-7BC6-595E-6ECE20BE6630}" dt="2023-04-11T16:40:24.608" v="70" actId="20577"/>
+        <pc:sldMkLst>
+          <pc:docMk/>
+          <pc:sldMk cId="3989611827" sldId="259"/>
+        </pc:sldMkLst>
+        <pc:spChg chg="mod">
+          <ac:chgData name="Varner, Paige (she/her/hers)" userId="S::varner.paige@epa.gov::fc0f6d83-b290-4717-9f0d-95009db32cbd" providerId="AD" clId="Web-{ED08E105-D996-7BC6-595E-6ECE20BE6630}" dt="2023-04-11T16:35:26.291" v="49"/>
+          <ac:spMkLst>
+            <pc:docMk/>
+            <pc:sldMk cId="3989611827" sldId="259"/>
+            <ac:spMk id="2" creationId="{6427F933-EFFA-5187-6A06-328B41BF4BE4}"/>
+          </ac:spMkLst>
+        </pc:spChg>
+        <pc:spChg chg="mod">
+          <ac:chgData name="Varner, Paige (she/her/hers)" userId="S::varner.paige@epa.gov::fc0f6d83-b290-4717-9f0d-95009db32cbd" providerId="AD" clId="Web-{ED08E105-D996-7BC6-595E-6ECE20BE6630}" dt="2023-04-11T16:35:29.697" v="50"/>
+          <ac:spMkLst>
+            <pc:docMk/>
+            <pc:sldMk cId="3989611827" sldId="259"/>
+            <ac:spMk id="3" creationId="{DAC9B4E7-F773-02AC-A796-357838431F91}"/>
+          </ac:spMkLst>
+        </pc:spChg>
+        <pc:spChg chg="mod">
+          <ac:chgData name="Varner, Paige (she/her/hers)" userId="S::varner.paige@epa.gov::fc0f6d83-b290-4717-9f0d-95009db32cbd" providerId="AD" clId="Web-{ED08E105-D996-7BC6-595E-6ECE20BE6630}" dt="2023-04-11T16:40:24.608" v="70" actId="20577"/>
+          <ac:spMkLst>
+            <pc:docMk/>
+            <pc:sldMk cId="3989611827" sldId="259"/>
+            <ac:spMk id="4" creationId="{6774AB7A-3034-44B5-8BBD-58941BACFBE9}"/>
+          </ac:spMkLst>
+        </pc:spChg>
+        <pc:spChg chg="mod">
+          <ac:chgData name="Varner, Paige (she/her/hers)" userId="S::varner.paige@epa.gov::fc0f6d83-b290-4717-9f0d-95009db32cbd" providerId="AD" clId="Web-{ED08E105-D996-7BC6-595E-6ECE20BE6630}" dt="2023-04-11T16:38:41.997" v="67" actId="20577"/>
+          <ac:spMkLst>
+            <pc:docMk/>
+            <pc:sldMk cId="3989611827" sldId="259"/>
+            <ac:spMk id="5" creationId="{479FD662-7FA9-1241-E357-1CD586678554}"/>
+          </ac:spMkLst>
+        </pc:spChg>
+      </pc:sldChg>
+      <pc:sldChg chg="addSp modSp">
+        <pc:chgData name="Varner, Paige (she/her/hers)" userId="S::varner.paige@epa.gov::fc0f6d83-b290-4717-9f0d-95009db32cbd" providerId="AD" clId="Web-{ED08E105-D996-7BC6-595E-6ECE20BE6630}" dt="2023-04-11T16:51:19.915" v="200"/>
+        <pc:sldMkLst>
+          <pc:docMk/>
+          <pc:sldMk cId="1226469851" sldId="260"/>
+        </pc:sldMkLst>
+        <pc:spChg chg="mod">
+          <ac:chgData name="Varner, Paige (she/her/hers)" userId="S::varner.paige@epa.gov::fc0f6d83-b290-4717-9f0d-95009db32cbd" providerId="AD" clId="Web-{ED08E105-D996-7BC6-595E-6ECE20BE6630}" dt="2023-04-11T16:49:56.070" v="145"/>
+          <ac:spMkLst>
+            <pc:docMk/>
+            <pc:sldMk cId="1226469851" sldId="260"/>
+            <ac:spMk id="2" creationId="{6427F933-EFFA-5187-6A06-328B41BF4BE4}"/>
+          </ac:spMkLst>
+        </pc:spChg>
+        <pc:spChg chg="mod">
+          <ac:chgData name="Varner, Paige (she/her/hers)" userId="S::varner.paige@epa.gov::fc0f6d83-b290-4717-9f0d-95009db32cbd" providerId="AD" clId="Web-{ED08E105-D996-7BC6-595E-6ECE20BE6630}" dt="2023-04-11T16:49:58.507" v="146"/>
+          <ac:spMkLst>
+            <pc:docMk/>
+            <pc:sldMk cId="1226469851" sldId="260"/>
+            <ac:spMk id="3" creationId="{DAC9B4E7-F773-02AC-A796-357838431F91}"/>
+          </ac:spMkLst>
+        </pc:spChg>
+        <pc:spChg chg="mod">
+          <ac:chgData name="Varner, Paige (she/her/hers)" userId="S::varner.paige@epa.gov::fc0f6d83-b290-4717-9f0d-95009db32cbd" providerId="AD" clId="Web-{ED08E105-D996-7BC6-595E-6ECE20BE6630}" dt="2023-04-11T16:49:09.256" v="144" actId="20577"/>
+          <ac:spMkLst>
+            <pc:docMk/>
+            <pc:sldMk cId="1226469851" sldId="260"/>
+            <ac:spMk id="4" creationId="{6774AB7A-3034-44B5-8BBD-58941BACFBE9}"/>
+          </ac:spMkLst>
+        </pc:spChg>
+        <pc:spChg chg="mod">
+          <ac:chgData name="Varner, Paige (she/her/hers)" userId="S::varner.paige@epa.gov::fc0f6d83-b290-4717-9f0d-95009db32cbd" providerId="AD" clId="Web-{ED08E105-D996-7BC6-595E-6ECE20BE6630}" dt="2023-04-11T16:48:42.397" v="113" actId="20577"/>
+          <ac:spMkLst>
+            <pc:docMk/>
+            <pc:sldMk cId="1226469851" sldId="260"/>
+            <ac:spMk id="5" creationId="{479FD662-7FA9-1241-E357-1CD586678554}"/>
+          </ac:spMkLst>
+        </pc:spChg>
+        <pc:spChg chg="add mod">
+          <ac:chgData name="Varner, Paige (she/her/hers)" userId="S::varner.paige@epa.gov::fc0f6d83-b290-4717-9f0d-95009db32cbd" providerId="AD" clId="Web-{ED08E105-D996-7BC6-595E-6ECE20BE6630}" dt="2023-04-11T16:51:19.915" v="200"/>
+          <ac:spMkLst>
+            <pc:docMk/>
+            <pc:sldMk cId="1226469851" sldId="260"/>
+            <ac:spMk id="12" creationId="{AA23B7E6-73AA-C926-F8C8-47839B07FAF7}"/>
+          </ac:spMkLst>
+        </pc:spChg>
+      </pc:sldChg>
+      <pc:sldChg chg="addSp delSp modSp ord">
+        <pc:chgData name="Varner, Paige (she/her/hers)" userId="S::varner.paige@epa.gov::fc0f6d83-b290-4717-9f0d-95009db32cbd" providerId="AD" clId="Web-{ED08E105-D996-7BC6-595E-6ECE20BE6630}" dt="2023-04-11T16:55:24.762" v="209" actId="1076"/>
+        <pc:sldMkLst>
+          <pc:docMk/>
+          <pc:sldMk cId="3243331262" sldId="261"/>
+        </pc:sldMkLst>
+        <pc:spChg chg="add mod">
+          <ac:chgData name="Varner, Paige (she/her/hers)" userId="S::varner.paige@epa.gov::fc0f6d83-b290-4717-9f0d-95009db32cbd" providerId="AD" clId="Web-{ED08E105-D996-7BC6-595E-6ECE20BE6630}" dt="2023-04-11T16:50:53.805" v="192" actId="14100"/>
+          <ac:spMkLst>
+            <pc:docMk/>
+            <pc:sldMk cId="3243331262" sldId="261"/>
+            <ac:spMk id="10" creationId="{5CE2C573-7270-5C96-F8CB-9B37D5E68572}"/>
+          </ac:spMkLst>
+        </pc:spChg>
+        <pc:picChg chg="del">
+          <ac:chgData name="Varner, Paige (she/her/hers)" userId="S::varner.paige@epa.gov::fc0f6d83-b290-4717-9f0d-95009db32cbd" providerId="AD" clId="Web-{ED08E105-D996-7BC6-595E-6ECE20BE6630}" dt="2023-04-11T16:54:39.027" v="205"/>
+          <ac:picMkLst>
+            <pc:docMk/>
+            <pc:sldMk cId="3243331262" sldId="261"/>
+            <ac:picMk id="8" creationId="{62A38EE5-B6F5-D8C4-0F85-75FC3F61DF4F}"/>
+          </ac:picMkLst>
+        </pc:picChg>
+        <pc:picChg chg="add mod">
+          <ac:chgData name="Varner, Paige (she/her/hers)" userId="S::varner.paige@epa.gov::fc0f6d83-b290-4717-9f0d-95009db32cbd" providerId="AD" clId="Web-{ED08E105-D996-7BC6-595E-6ECE20BE6630}" dt="2023-04-11T16:55:24.762" v="209" actId="1076"/>
+          <ac:picMkLst>
+            <pc:docMk/>
+            <pc:sldMk cId="3243331262" sldId="261"/>
+            <ac:picMk id="11" creationId="{B0ADD72F-D75F-F94E-08F0-1CC5231BFB3F}"/>
+          </ac:picMkLst>
+        </pc:picChg>
+      </pc:sldChg>
+      <pc:sldChg chg="addSp modSp">
+        <pc:chgData name="Varner, Paige (she/her/hers)" userId="S::varner.paige@epa.gov::fc0f6d83-b290-4717-9f0d-95009db32cbd" providerId="AD" clId="Web-{ED08E105-D996-7BC6-595E-6ECE20BE6630}" dt="2023-04-11T16:51:27.118" v="201"/>
+        <pc:sldMkLst>
+          <pc:docMk/>
+          <pc:sldMk cId="1997747637" sldId="262"/>
+        </pc:sldMkLst>
+        <pc:spChg chg="mod">
+          <ac:chgData name="Varner, Paige (she/her/hers)" userId="S::varner.paige@epa.gov::fc0f6d83-b290-4717-9f0d-95009db32cbd" providerId="AD" clId="Web-{ED08E105-D996-7BC6-595E-6ECE20BE6630}" dt="2023-04-11T16:51:09.133" v="198"/>
+          <ac:spMkLst>
+            <pc:docMk/>
+            <pc:sldMk cId="1997747637" sldId="262"/>
+            <ac:spMk id="2" creationId="{6427F933-EFFA-5187-6A06-328B41BF4BE4}"/>
+          </ac:spMkLst>
+        </pc:spChg>
+        <pc:spChg chg="mod">
+          <ac:chgData name="Varner, Paige (she/her/hers)" userId="S::varner.paige@epa.gov::fc0f6d83-b290-4717-9f0d-95009db32cbd" providerId="AD" clId="Web-{ED08E105-D996-7BC6-595E-6ECE20BE6630}" dt="2023-04-11T16:51:11.368" v="199"/>
+          <ac:spMkLst>
+            <pc:docMk/>
+            <pc:sldMk cId="1997747637" sldId="262"/>
+            <ac:spMk id="3" creationId="{DAC9B4E7-F773-02AC-A796-357838431F91}"/>
+          </ac:spMkLst>
+        </pc:spChg>
+        <pc:spChg chg="add mod">
+          <ac:chgData name="Varner, Paige (she/her/hers)" userId="S::varner.paige@epa.gov::fc0f6d83-b290-4717-9f0d-95009db32cbd" providerId="AD" clId="Web-{ED08E105-D996-7BC6-595E-6ECE20BE6630}" dt="2023-04-11T16:51:27.118" v="201"/>
+          <ac:spMkLst>
+            <pc:docMk/>
+            <pc:sldMk cId="1997747637" sldId="262"/>
+            <ac:spMk id="10" creationId="{389757B4-DDB7-938D-30F7-5784962CECB6}"/>
+          </ac:spMkLst>
+        </pc:spChg>
+      </pc:sldChg>
+    </pc:docChg>
+  </pc:docChgLst>
+  <pc:docChgLst>
+    <pc:chgData name="Varner, Paige (she/her/hers)" userId="S::varner.paige@epa.gov::fc0f6d83-b290-4717-9f0d-95009db32cbd" providerId="AD" clId="Web-{003A89AD-F3E6-241F-AB04-42E60A029CD3}"/>
+    <pc:docChg chg="modSld">
+      <pc:chgData name="Varner, Paige (she/her/hers)" userId="S::varner.paige@epa.gov::fc0f6d83-b290-4717-9f0d-95009db32cbd" providerId="AD" clId="Web-{003A89AD-F3E6-241F-AB04-42E60A029CD3}" dt="2023-04-12T16:44:50.729" v="290" actId="20577"/>
+      <pc:docMkLst>
+        <pc:docMk/>
+      </pc:docMkLst>
+      <pc:sldChg chg="modSp">
+        <pc:chgData name="Varner, Paige (she/her/hers)" userId="S::varner.paige@epa.gov::fc0f6d83-b290-4717-9f0d-95009db32cbd" providerId="AD" clId="Web-{003A89AD-F3E6-241F-AB04-42E60A029CD3}" dt="2023-04-12T16:44:50.729" v="290" actId="20577"/>
+        <pc:sldMkLst>
+          <pc:docMk/>
+          <pc:sldMk cId="3524633860" sldId="267"/>
+        </pc:sldMkLst>
+        <pc:spChg chg="mod">
+          <ac:chgData name="Varner, Paige (she/her/hers)" userId="S::varner.paige@epa.gov::fc0f6d83-b290-4717-9f0d-95009db32cbd" providerId="AD" clId="Web-{003A89AD-F3E6-241F-AB04-42E60A029CD3}" dt="2023-04-12T16:44:50.729" v="290" actId="20577"/>
+          <ac:spMkLst>
+            <pc:docMk/>
+            <pc:sldMk cId="3524633860" sldId="267"/>
+            <ac:spMk id="4" creationId="{EA7FD89D-F11C-3331-50F1-55E61EDC50AA}"/>
+          </ac:spMkLst>
+        </pc:spChg>
+      </pc:sldChg>
+    </pc:docChg>
+  </pc:docChgLst>
+  <pc:docChgLst>
+    <pc:chgData name="Fry, Meridith (she/her/hers)" userId="744b0799-9c5f-4010-b84c-816c454cc486" providerId="ADAL" clId="{B448CFAC-879E-423A-8E7D-4DD1035F7C5E}"/>
+    <pc:docChg chg="custSel modSld">
+      <pc:chgData name="Fry, Meridith (she/her/hers)" userId="744b0799-9c5f-4010-b84c-816c454cc486" providerId="ADAL" clId="{B448CFAC-879E-423A-8E7D-4DD1035F7C5E}" dt="2023-06-14T16:46:49.366" v="31" actId="20577"/>
+      <pc:docMkLst>
+        <pc:docMk/>
+      </pc:docMkLst>
+      <pc:sldChg chg="modSp mod">
+        <pc:chgData name="Fry, Meridith (she/her/hers)" userId="744b0799-9c5f-4010-b84c-816c454cc486" providerId="ADAL" clId="{B448CFAC-879E-423A-8E7D-4DD1035F7C5E}" dt="2023-06-14T16:45:10.374" v="4" actId="33524"/>
+        <pc:sldMkLst>
+          <pc:docMk/>
+          <pc:sldMk cId="3989611827" sldId="259"/>
+        </pc:sldMkLst>
+        <pc:spChg chg="mod">
+          <ac:chgData name="Fry, Meridith (she/her/hers)" userId="744b0799-9c5f-4010-b84c-816c454cc486" providerId="ADAL" clId="{B448CFAC-879E-423A-8E7D-4DD1035F7C5E}" dt="2023-06-14T16:45:10.374" v="4" actId="33524"/>
+          <ac:spMkLst>
+            <pc:docMk/>
+            <pc:sldMk cId="3989611827" sldId="259"/>
+            <ac:spMk id="4" creationId="{6774AB7A-3034-44B5-8BBD-58941BACFBE9}"/>
+          </ac:spMkLst>
+        </pc:spChg>
+      </pc:sldChg>
+      <pc:sldChg chg="modSp mod">
+        <pc:chgData name="Fry, Meridith (she/her/hers)" userId="744b0799-9c5f-4010-b84c-816c454cc486" providerId="ADAL" clId="{B448CFAC-879E-423A-8E7D-4DD1035F7C5E}" dt="2023-06-14T16:44:35.796" v="1" actId="20577"/>
+        <pc:sldMkLst>
+          <pc:docMk/>
+          <pc:sldMk cId="1226469851" sldId="260"/>
+        </pc:sldMkLst>
+        <pc:spChg chg="mod">
+          <ac:chgData name="Fry, Meridith (she/her/hers)" userId="744b0799-9c5f-4010-b84c-816c454cc486" providerId="ADAL" clId="{B448CFAC-879E-423A-8E7D-4DD1035F7C5E}" dt="2023-06-14T16:44:35.796" v="1" actId="20577"/>
+          <ac:spMkLst>
+            <pc:docMk/>
+            <pc:sldMk cId="1226469851" sldId="260"/>
+            <ac:spMk id="4" creationId="{6774AB7A-3034-44B5-8BBD-58941BACFBE9}"/>
+          </ac:spMkLst>
+        </pc:spChg>
+      </pc:sldChg>
+      <pc:sldChg chg="modSp mod">
+        <pc:chgData name="Fry, Meridith (she/her/hers)" userId="744b0799-9c5f-4010-b84c-816c454cc486" providerId="ADAL" clId="{B448CFAC-879E-423A-8E7D-4DD1035F7C5E}" dt="2023-06-14T16:44:31.714" v="0" actId="20577"/>
+        <pc:sldMkLst>
+          <pc:docMk/>
+          <pc:sldMk cId="3243331262" sldId="261"/>
+        </pc:sldMkLst>
+        <pc:spChg chg="mod">
+          <ac:chgData name="Fry, Meridith (she/her/hers)" userId="744b0799-9c5f-4010-b84c-816c454cc486" providerId="ADAL" clId="{B448CFAC-879E-423A-8E7D-4DD1035F7C5E}" dt="2023-06-14T16:44:31.714" v="0" actId="20577"/>
+          <ac:spMkLst>
+            <pc:docMk/>
+            <pc:sldMk cId="3243331262" sldId="261"/>
+            <ac:spMk id="4" creationId="{6774AB7A-3034-44B5-8BBD-58941BACFBE9}"/>
+          </ac:spMkLst>
+        </pc:spChg>
+      </pc:sldChg>
+      <pc:sldChg chg="modSp mod">
+        <pc:chgData name="Fry, Meridith (she/her/hers)" userId="744b0799-9c5f-4010-b84c-816c454cc486" providerId="ADAL" clId="{B448CFAC-879E-423A-8E7D-4DD1035F7C5E}" dt="2023-06-14T16:44:57.791" v="2" actId="6549"/>
+        <pc:sldMkLst>
+          <pc:docMk/>
+          <pc:sldMk cId="1997747637" sldId="262"/>
+        </pc:sldMkLst>
+        <pc:spChg chg="mod">
+          <ac:chgData name="Fry, Meridith (she/her/hers)" userId="744b0799-9c5f-4010-b84c-816c454cc486" providerId="ADAL" clId="{B448CFAC-879E-423A-8E7D-4DD1035F7C5E}" dt="2023-06-14T16:44:57.791" v="2" actId="6549"/>
+          <ac:spMkLst>
+            <pc:docMk/>
+            <pc:sldMk cId="1997747637" sldId="262"/>
+            <ac:spMk id="4" creationId="{6774AB7A-3034-44B5-8BBD-58941BACFBE9}"/>
+          </ac:spMkLst>
+        </pc:spChg>
+      </pc:sldChg>
+      <pc:sldChg chg="modSp mod">
+        <pc:chgData name="Fry, Meridith (she/her/hers)" userId="744b0799-9c5f-4010-b84c-816c454cc486" providerId="ADAL" clId="{B448CFAC-879E-423A-8E7D-4DD1035F7C5E}" dt="2023-06-14T16:45:21.341" v="6" actId="6549"/>
+        <pc:sldMkLst>
+          <pc:docMk/>
+          <pc:sldMk cId="3402338812" sldId="264"/>
+        </pc:sldMkLst>
+        <pc:spChg chg="mod">
+          <ac:chgData name="Fry, Meridith (she/her/hers)" userId="744b0799-9c5f-4010-b84c-816c454cc486" providerId="ADAL" clId="{B448CFAC-879E-423A-8E7D-4DD1035F7C5E}" dt="2023-06-14T16:45:21.341" v="6" actId="6549"/>
+          <ac:spMkLst>
+            <pc:docMk/>
+            <pc:sldMk cId="3402338812" sldId="264"/>
+            <ac:spMk id="4" creationId="{6774AB7A-3034-44B5-8BBD-58941BACFBE9}"/>
+          </ac:spMkLst>
+        </pc:spChg>
+      </pc:sldChg>
+      <pc:sldChg chg="modSp mod">
+        <pc:chgData name="Fry, Meridith (she/her/hers)" userId="744b0799-9c5f-4010-b84c-816c454cc486" providerId="ADAL" clId="{B448CFAC-879E-423A-8E7D-4DD1035F7C5E}" dt="2023-06-14T16:46:49.366" v="31" actId="20577"/>
+        <pc:sldMkLst>
+          <pc:docMk/>
+          <pc:sldMk cId="3524633860" sldId="267"/>
+        </pc:sldMkLst>
+        <pc:spChg chg="mod">
+          <ac:chgData name="Fry, Meridith (she/her/hers)" userId="744b0799-9c5f-4010-b84c-816c454cc486" providerId="ADAL" clId="{B448CFAC-879E-423A-8E7D-4DD1035F7C5E}" dt="2023-06-14T16:46:49.366" v="31" actId="20577"/>
+          <ac:spMkLst>
+            <pc:docMk/>
+            <pc:sldMk cId="3524633860" sldId="267"/>
+            <ac:spMk id="4" creationId="{EA7FD89D-F11C-3331-50F1-55E61EDC50AA}"/>
           </ac:spMkLst>
         </pc:spChg>
       </pc:sldChg>
@@ -1347,131 +1556,6 @@
           <pc:docMk/>
           <pc:sldMk cId="3164985413" sldId="269"/>
         </pc:sldMkLst>
-      </pc:sldChg>
-    </pc:docChg>
-  </pc:docChgLst>
-  <pc:docChgLst>
-    <pc:chgData name="Fry, Meridith (she/her/hers)" userId="S::fry.meridith@epa.gov::744b0799-9c5f-4010-b84c-816c454cc486" providerId="AD" clId="Web-{BCF4F10D-1701-433C-8F39-6EAF882CAC0B}"/>
-    <pc:docChg chg="modSld">
-      <pc:chgData name="Fry, Meridith (she/her/hers)" userId="S::fry.meridith@epa.gov::744b0799-9c5f-4010-b84c-816c454cc486" providerId="AD" clId="Web-{BCF4F10D-1701-433C-8F39-6EAF882CAC0B}" dt="2023-04-12T13:00:32.437" v="1" actId="20577"/>
-      <pc:docMkLst>
-        <pc:docMk/>
-      </pc:docMkLst>
-      <pc:sldChg chg="modSp">
-        <pc:chgData name="Fry, Meridith (she/her/hers)" userId="S::fry.meridith@epa.gov::744b0799-9c5f-4010-b84c-816c454cc486" providerId="AD" clId="Web-{BCF4F10D-1701-433C-8F39-6EAF882CAC0B}" dt="2023-04-12T13:00:32.437" v="1" actId="20577"/>
-        <pc:sldMkLst>
-          <pc:docMk/>
-          <pc:sldMk cId="3989611827" sldId="259"/>
-        </pc:sldMkLst>
-        <pc:spChg chg="mod">
-          <ac:chgData name="Fry, Meridith (she/her/hers)" userId="S::fry.meridith@epa.gov::744b0799-9c5f-4010-b84c-816c454cc486" providerId="AD" clId="Web-{BCF4F10D-1701-433C-8F39-6EAF882CAC0B}" dt="2023-04-12T13:00:32.437" v="1" actId="20577"/>
-          <ac:spMkLst>
-            <pc:docMk/>
-            <pc:sldMk cId="3989611827" sldId="259"/>
-            <ac:spMk id="4" creationId="{6774AB7A-3034-44B5-8BBD-58941BACFBE9}"/>
-          </ac:spMkLst>
-        </pc:spChg>
-      </pc:sldChg>
-    </pc:docChg>
-  </pc:docChgLst>
-  <pc:docChgLst>
-    <pc:chgData name="Roemer, Kelli" userId="S::roemer.kelli@epa.gov::cdc1d093-60ef-47f5-9329-cda3558f2540" providerId="AD" clId="Web-{E666E214-8DBF-4FC1-8652-30E9224AA5F4}"/>
-    <pc:docChg chg="addSld delSld modSld">
-      <pc:chgData name="Roemer, Kelli" userId="S::roemer.kelli@epa.gov::cdc1d093-60ef-47f5-9329-cda3558f2540" providerId="AD" clId="Web-{E666E214-8DBF-4FC1-8652-30E9224AA5F4}" dt="2023-04-12T15:36:20.183" v="251" actId="20577"/>
-      <pc:docMkLst>
-        <pc:docMk/>
-      </pc:docMkLst>
-      <pc:sldChg chg="modSp">
-        <pc:chgData name="Roemer, Kelli" userId="S::roemer.kelli@epa.gov::cdc1d093-60ef-47f5-9329-cda3558f2540" providerId="AD" clId="Web-{E666E214-8DBF-4FC1-8652-30E9224AA5F4}" dt="2023-04-12T15:36:20.183" v="251" actId="20577"/>
-        <pc:sldMkLst>
-          <pc:docMk/>
-          <pc:sldMk cId="3989611827" sldId="259"/>
-        </pc:sldMkLst>
-        <pc:spChg chg="mod">
-          <ac:chgData name="Roemer, Kelli" userId="S::roemer.kelli@epa.gov::cdc1d093-60ef-47f5-9329-cda3558f2540" providerId="AD" clId="Web-{E666E214-8DBF-4FC1-8652-30E9224AA5F4}" dt="2023-04-12T15:36:20.183" v="251" actId="20577"/>
-          <ac:spMkLst>
-            <pc:docMk/>
-            <pc:sldMk cId="3989611827" sldId="259"/>
-            <ac:spMk id="13" creationId="{32F63358-C413-5F0C-AA2C-84B1790960E2}"/>
-          </ac:spMkLst>
-        </pc:spChg>
-      </pc:sldChg>
-      <pc:sldChg chg="addSp modSp">
-        <pc:chgData name="Roemer, Kelli" userId="S::roemer.kelli@epa.gov::cdc1d093-60ef-47f5-9329-cda3558f2540" providerId="AD" clId="Web-{E666E214-8DBF-4FC1-8652-30E9224AA5F4}" dt="2023-04-12T15:18:55.700" v="57" actId="14100"/>
-        <pc:sldMkLst>
-          <pc:docMk/>
-          <pc:sldMk cId="3402338812" sldId="264"/>
-        </pc:sldMkLst>
-        <pc:spChg chg="add mod">
-          <ac:chgData name="Roemer, Kelli" userId="S::roemer.kelli@epa.gov::cdc1d093-60ef-47f5-9329-cda3558f2540" providerId="AD" clId="Web-{E666E214-8DBF-4FC1-8652-30E9224AA5F4}" dt="2023-04-12T15:18:55.700" v="57" actId="14100"/>
-          <ac:spMkLst>
-            <pc:docMk/>
-            <pc:sldMk cId="3402338812" sldId="264"/>
-            <ac:spMk id="15" creationId="{CBEB9FD7-71D9-3E6D-AC9B-3D00553D039A}"/>
-          </ac:spMkLst>
-        </pc:spChg>
-      </pc:sldChg>
-      <pc:sldChg chg="addSp modSp">
-        <pc:chgData name="Roemer, Kelli" userId="S::roemer.kelli@epa.gov::cdc1d093-60ef-47f5-9329-cda3558f2540" providerId="AD" clId="Web-{E666E214-8DBF-4FC1-8652-30E9224AA5F4}" dt="2023-04-12T15:27:59.020" v="238" actId="20577"/>
-        <pc:sldMkLst>
-          <pc:docMk/>
-          <pc:sldMk cId="431036989" sldId="265"/>
-        </pc:sldMkLst>
-        <pc:spChg chg="mod">
-          <ac:chgData name="Roemer, Kelli" userId="S::roemer.kelli@epa.gov::cdc1d093-60ef-47f5-9329-cda3558f2540" providerId="AD" clId="Web-{E666E214-8DBF-4FC1-8652-30E9224AA5F4}" dt="2023-04-12T15:27:59.020" v="238" actId="20577"/>
-          <ac:spMkLst>
-            <pc:docMk/>
-            <pc:sldMk cId="431036989" sldId="265"/>
-            <ac:spMk id="15" creationId="{3DA06D0A-88ED-BBC7-5940-82343BD55444}"/>
-          </ac:spMkLst>
-        </pc:spChg>
-        <pc:cxnChg chg="add mod">
-          <ac:chgData name="Roemer, Kelli" userId="S::roemer.kelli@epa.gov::cdc1d093-60ef-47f5-9329-cda3558f2540" providerId="AD" clId="Web-{E666E214-8DBF-4FC1-8652-30E9224AA5F4}" dt="2023-04-12T15:26:09.034" v="177" actId="14100"/>
-          <ac:cxnSpMkLst>
-            <pc:docMk/>
-            <pc:sldMk cId="431036989" sldId="265"/>
-            <ac:cxnSpMk id="6" creationId="{1355C48F-E32E-39DE-93DD-7FEFC47F75CA}"/>
-          </ac:cxnSpMkLst>
-        </pc:cxnChg>
-        <pc:cxnChg chg="add mod">
-          <ac:chgData name="Roemer, Kelli" userId="S::roemer.kelli@epa.gov::cdc1d093-60ef-47f5-9329-cda3558f2540" providerId="AD" clId="Web-{E666E214-8DBF-4FC1-8652-30E9224AA5F4}" dt="2023-04-12T15:24:39.611" v="115" actId="14100"/>
-          <ac:cxnSpMkLst>
-            <pc:docMk/>
-            <pc:sldMk cId="431036989" sldId="265"/>
-            <ac:cxnSpMk id="7" creationId="{34A63D27-F8F9-1239-C667-6847C9FC9892}"/>
-          </ac:cxnSpMkLst>
-        </pc:cxnChg>
-      </pc:sldChg>
-      <pc:sldChg chg="delSp modSp add del replId">
-        <pc:chgData name="Roemer, Kelli" userId="S::roemer.kelli@epa.gov::cdc1d093-60ef-47f5-9329-cda3558f2540" providerId="AD" clId="Web-{E666E214-8DBF-4FC1-8652-30E9224AA5F4}" dt="2023-04-12T15:23:10.500" v="106"/>
-        <pc:sldMkLst>
-          <pc:docMk/>
-          <pc:sldMk cId="986803219" sldId="266"/>
-        </pc:sldMkLst>
-        <pc:spChg chg="mod">
-          <ac:chgData name="Roemer, Kelli" userId="S::roemer.kelli@epa.gov::cdc1d093-60ef-47f5-9329-cda3558f2540" providerId="AD" clId="Web-{E666E214-8DBF-4FC1-8652-30E9224AA5F4}" dt="2023-04-12T15:22:27.765" v="105" actId="20577"/>
-          <ac:spMkLst>
-            <pc:docMk/>
-            <pc:sldMk cId="986803219" sldId="266"/>
-            <ac:spMk id="4" creationId="{6774AB7A-3034-44B5-8BBD-58941BACFBE9}"/>
-          </ac:spMkLst>
-        </pc:spChg>
-        <pc:spChg chg="del">
-          <ac:chgData name="Roemer, Kelli" userId="S::roemer.kelli@epa.gov::cdc1d093-60ef-47f5-9329-cda3558f2540" providerId="AD" clId="Web-{E666E214-8DBF-4FC1-8652-30E9224AA5F4}" dt="2023-04-12T15:21:38.702" v="74"/>
-          <ac:spMkLst>
-            <pc:docMk/>
-            <pc:sldMk cId="986803219" sldId="266"/>
-            <ac:spMk id="9" creationId="{54FF9B3B-D48F-86CC-9B69-1201EE6DF0B4}"/>
-          </ac:spMkLst>
-        </pc:spChg>
-        <pc:picChg chg="mod">
-          <ac:chgData name="Roemer, Kelli" userId="S::roemer.kelli@epa.gov::cdc1d093-60ef-47f5-9329-cda3558f2540" providerId="AD" clId="Web-{E666E214-8DBF-4FC1-8652-30E9224AA5F4}" dt="2023-04-12T15:21:56.155" v="87" actId="1076"/>
-          <ac:picMkLst>
-            <pc:docMk/>
-            <pc:sldMk cId="986803219" sldId="266"/>
-            <ac:picMk id="8" creationId="{62A38EE5-B6F5-D8C4-0F85-75FC3F61DF4F}"/>
-          </ac:picMkLst>
-        </pc:picChg>
       </pc:sldChg>
     </pc:docChg>
   </pc:docChgLst>
@@ -1560,7 +1644,7 @@
           <a:p>
             <a:fld id="{9E6ED5E1-6901-4F50-9885-93F2D4E535B8}" type="datetimeFigureOut">
               <a:rPr lang="en-US" smtClean="0"/>
-              <a:t>4/12/2023</a:t>
+              <a:t>6/14/2023</a:t>
             </a:fld>
             <a:endParaRPr lang="en-US"/>
           </a:p>
@@ -2058,7 +2142,7 @@
           <a:p>
             <a:fld id="{F92F5159-0039-4F61-9C82-ED7B693482C3}" type="datetimeFigureOut">
               <a:rPr lang="en-US" smtClean="0"/>
-              <a:t>4/12/2023</a:t>
+              <a:t>6/14/2023</a:t>
             </a:fld>
             <a:endParaRPr lang="en-US"/>
           </a:p>
@@ -2256,7 +2340,7 @@
           <a:p>
             <a:fld id="{F92F5159-0039-4F61-9C82-ED7B693482C3}" type="datetimeFigureOut">
               <a:rPr lang="en-US" smtClean="0"/>
-              <a:t>4/12/2023</a:t>
+              <a:t>6/14/2023</a:t>
             </a:fld>
             <a:endParaRPr lang="en-US"/>
           </a:p>
@@ -2464,7 +2548,7 @@
           <a:p>
             <a:fld id="{F92F5159-0039-4F61-9C82-ED7B693482C3}" type="datetimeFigureOut">
               <a:rPr lang="en-US" smtClean="0"/>
-              <a:t>4/12/2023</a:t>
+              <a:t>6/14/2023</a:t>
             </a:fld>
             <a:endParaRPr lang="en-US"/>
           </a:p>
@@ -2662,7 +2746,7 @@
           <a:p>
             <a:fld id="{F92F5159-0039-4F61-9C82-ED7B693482C3}" type="datetimeFigureOut">
               <a:rPr lang="en-US" smtClean="0"/>
-              <a:t>4/12/2023</a:t>
+              <a:t>6/14/2023</a:t>
             </a:fld>
             <a:endParaRPr lang="en-US"/>
           </a:p>
@@ -2937,7 +3021,7 @@
           <a:p>
             <a:fld id="{F92F5159-0039-4F61-9C82-ED7B693482C3}" type="datetimeFigureOut">
               <a:rPr lang="en-US" smtClean="0"/>
-              <a:t>4/12/2023</a:t>
+              <a:t>6/14/2023</a:t>
             </a:fld>
             <a:endParaRPr lang="en-US"/>
           </a:p>
@@ -3202,7 +3286,7 @@
           <a:p>
             <a:fld id="{F92F5159-0039-4F61-9C82-ED7B693482C3}" type="datetimeFigureOut">
               <a:rPr lang="en-US" smtClean="0"/>
-              <a:t>4/12/2023</a:t>
+              <a:t>6/14/2023</a:t>
             </a:fld>
             <a:endParaRPr lang="en-US"/>
           </a:p>
@@ -3614,7 +3698,7 @@
           <a:p>
             <a:fld id="{F92F5159-0039-4F61-9C82-ED7B693482C3}" type="datetimeFigureOut">
               <a:rPr lang="en-US" smtClean="0"/>
-              <a:t>4/12/2023</a:t>
+              <a:t>6/14/2023</a:t>
             </a:fld>
             <a:endParaRPr lang="en-US"/>
           </a:p>
@@ -3755,7 +3839,7 @@
           <a:p>
             <a:fld id="{F92F5159-0039-4F61-9C82-ED7B693482C3}" type="datetimeFigureOut">
               <a:rPr lang="en-US" smtClean="0"/>
-              <a:t>4/12/2023</a:t>
+              <a:t>6/14/2023</a:t>
             </a:fld>
             <a:endParaRPr lang="en-US"/>
           </a:p>
@@ -3868,7 +3952,7 @@
           <a:p>
             <a:fld id="{F92F5159-0039-4F61-9C82-ED7B693482C3}" type="datetimeFigureOut">
               <a:rPr lang="en-US" smtClean="0"/>
-              <a:t>4/12/2023</a:t>
+              <a:t>6/14/2023</a:t>
             </a:fld>
             <a:endParaRPr lang="en-US"/>
           </a:p>
@@ -4179,7 +4263,7 @@
           <a:p>
             <a:fld id="{F92F5159-0039-4F61-9C82-ED7B693482C3}" type="datetimeFigureOut">
               <a:rPr lang="en-US" smtClean="0"/>
-              <a:t>4/12/2023</a:t>
+              <a:t>6/14/2023</a:t>
             </a:fld>
             <a:endParaRPr lang="en-US"/>
           </a:p>
@@ -4467,7 +4551,7 @@
           <a:p>
             <a:fld id="{F92F5159-0039-4F61-9C82-ED7B693482C3}" type="datetimeFigureOut">
               <a:rPr lang="en-US" smtClean="0"/>
-              <a:t>4/12/2023</a:t>
+              <a:t>6/14/2023</a:t>
             </a:fld>
             <a:endParaRPr lang="en-US"/>
           </a:p>
@@ -4708,7 +4792,7 @@
           <a:p>
             <a:fld id="{F92F5159-0039-4F61-9C82-ED7B693482C3}" type="datetimeFigureOut">
               <a:rPr lang="en-US" smtClean="0"/>
-              <a:t>4/12/2023</a:t>
+              <a:t>6/14/2023</a:t>
             </a:fld>
             <a:endParaRPr lang="en-US"/>
           </a:p>
@@ -5193,19 +5277,19 @@
           <a:lstStyle/>
           <a:p>
             <a:r>
-              <a:rPr lang="en-US" sz="2000" b="1">
+              <a:rPr lang="en-US" sz="2000" b="1" dirty="0">
                 <a:cs typeface="Calibri" panose="020F0502020204030204"/>
               </a:rPr>
               <a:t>Description:</a:t>
             </a:r>
             <a:r>
-              <a:rPr lang="en-US" sz="2000">
+              <a:rPr lang="en-US" sz="2000" dirty="0">
                 <a:cs typeface="Calibri" panose="020F0502020204030204"/>
               </a:rPr>
               <a:t> </a:t>
             </a:r>
             <a:r>
-              <a:rPr lang="en-US" sz="2000">
+              <a:rPr lang="en-US" sz="2000" dirty="0">
                 <a:ea typeface="+mn-lt"/>
                 <a:cs typeface="+mn-lt"/>
               </a:rPr>
@@ -5213,32 +5297,32 @@
             </a:r>
           </a:p>
           <a:p>
-            <a:endParaRPr lang="en-US" sz="2000">
+            <a:endParaRPr lang="en-US" sz="2000" dirty="0">
               <a:cs typeface="Calibri" panose="020F0502020204030204"/>
             </a:endParaRPr>
           </a:p>
           <a:p>
             <a:r>
-              <a:rPr lang="en-US" sz="2000" b="1">
+              <a:rPr lang="en-US" sz="2000" b="1" dirty="0">
                 <a:cs typeface="Calibri" panose="020F0502020204030204"/>
               </a:rPr>
               <a:t>Why do this:</a:t>
             </a:r>
             <a:r>
-              <a:rPr lang="en-US" sz="2000">
+              <a:rPr lang="en-US" sz="2000" dirty="0">
                 <a:cs typeface="Calibri" panose="020F0502020204030204"/>
               </a:rPr>
               <a:t> The indicators for each system can be used to assess how well that system is doing relative to its potential for supporting equitable resilience. </a:t>
             </a:r>
           </a:p>
           <a:p>
-            <a:endParaRPr lang="en-US" sz="2000">
+            <a:endParaRPr lang="en-US" sz="2000" dirty="0">
               <a:cs typeface="Calibri" panose="020F0502020204030204"/>
             </a:endParaRPr>
           </a:p>
           <a:p>
             <a:r>
-              <a:rPr lang="en-US" sz="2000" b="1">
+              <a:rPr lang="en-US" sz="2000" b="1" dirty="0">
                 <a:cs typeface="Calibri" panose="020F0502020204030204"/>
               </a:rPr>
               <a:t>How do to this: </a:t>
@@ -5249,10 +5333,10 @@
               <a:buAutoNum type="arabicPeriod"/>
             </a:pPr>
             <a:r>
-              <a:rPr lang="en-US" sz="2000"/>
-              <a:t>Use the following card templates to create a card for each indicator you chose for your community from the Master Indicators List using data you collected within the Master Indicators List spreadsheet.</a:t>
-            </a:r>
-            <a:endParaRPr lang="en-US" sz="2000">
+              <a:rPr lang="en-US" sz="2000" dirty="0"/>
+              <a:t>Use the following card templates to create a card for each indicator you chose for your community from the Indicators List using data you collected within the Indicators List spreadsheet.</a:t>
+            </a:r>
+            <a:endParaRPr lang="en-US" sz="2000" dirty="0">
               <a:cs typeface="Calibri"/>
             </a:endParaRPr>
           </a:p>
@@ -5261,11 +5345,11 @@
               <a:buAutoNum type="arabicPeriod"/>
             </a:pPr>
             <a:r>
-              <a:rPr lang="en-US" sz="2000"/>
+              <a:rPr lang="en-US" sz="2000" dirty="0"/>
               <a:t>Use</a:t>
             </a:r>
             <a:r>
-              <a:rPr lang="en-US" sz="2000">
+              <a:rPr lang="en-US" sz="2000" dirty="0">
                 <a:cs typeface="Calibri"/>
               </a:rPr>
               <a:t> the color and icons to designate the 3 different resilient systems (social, built, and natural) for each indicator you chose to be used for the card sorting activity.</a:t>
@@ -5276,10 +5360,10 @@
               <a:buAutoNum type="arabicPeriod"/>
             </a:pPr>
             <a:r>
-              <a:rPr lang="en-US" sz="2000">
+              <a:rPr lang="en-US" sz="2000" dirty="0">
                 <a:cs typeface="Calibri"/>
               </a:rPr>
-              <a:t>Match up the information in the columns of the Master Indicator List to the sections on the indicator card to create each card.</a:t>
+              <a:t>Match up the information in the columns of the Indicator List to the sections on the indicator card to create each card.</a:t>
             </a:r>
           </a:p>
           <a:p>
@@ -5287,7 +5371,7 @@
               <a:buAutoNum type="arabicPeriod"/>
             </a:pPr>
             <a:r>
-              <a:rPr lang="en-US" sz="2000">
+              <a:rPr lang="en-US" sz="2000" dirty="0">
                 <a:cs typeface="Calibri"/>
               </a:rPr>
               <a:t>See slides 5 and 6 for an example of a filled out indicator card.</a:t>
@@ -5298,13 +5382,13 @@
               <a:buAutoNum type="arabicPeriod"/>
             </a:pPr>
             <a:r>
-              <a:rPr lang="en-US" sz="2000">
+              <a:rPr lang="en-US" sz="2000" dirty="0">
                 <a:ea typeface="+mn-lt"/>
                 <a:cs typeface="+mn-lt"/>
               </a:rPr>
               <a:t>Print out the completed indicator cards to use in the community workshop card sorting activity.</a:t>
             </a:r>
-            <a:endParaRPr lang="en-US" sz="2000">
+            <a:endParaRPr lang="en-US" sz="2000" dirty="0">
               <a:cs typeface="Calibri"/>
             </a:endParaRPr>
           </a:p>
@@ -5475,15 +5559,15 @@
           </a:bodyPr>
           <a:lstStyle/>
           <a:p>
-            <a:endParaRPr lang="en-US" sz="2400" b="1"/>
-          </a:p>
-          <a:p>
-            <a:endParaRPr lang="en-US" sz="2400" b="1"/>
+            <a:endParaRPr lang="en-US" sz="2400" b="1" dirty="0"/>
+          </a:p>
+          <a:p>
+            <a:endParaRPr lang="en-US" sz="2400" b="1" dirty="0"/>
           </a:p>
           <a:p>
             <a:pPr algn="ctr"/>
             <a:r>
-              <a:rPr lang="en-US" sz="2400" b="1">
+              <a:rPr lang="en-US" sz="2400" b="1" dirty="0">
                 <a:cs typeface="Calibri"/>
               </a:rPr>
               <a:t>Indicator </a:t>
@@ -5492,25 +5576,25 @@
           <a:p>
             <a:pPr algn="ctr"/>
             <a:r>
-              <a:rPr lang="en-US" sz="1400" i="1">
+              <a:rPr lang="en-US" sz="1400" i="1" dirty="0">
                 <a:ea typeface="+mn-lt"/>
                 <a:cs typeface="+mn-lt"/>
               </a:rPr>
               <a:t>Definition</a:t>
             </a:r>
-            <a:endParaRPr lang="en-US"/>
-          </a:p>
-          <a:p>
-            <a:endParaRPr lang="en-US" sz="1200">
+            <a:endParaRPr lang="en-US" dirty="0"/>
+          </a:p>
+          <a:p>
+            <a:endParaRPr lang="en-US" sz="1200" dirty="0">
               <a:cs typeface="Calibri"/>
             </a:endParaRPr>
           </a:p>
           <a:p>
             <a:r>
-              <a:rPr lang="en-US" b="1"/>
+              <a:rPr lang="en-US" b="1" dirty="0"/>
               <a:t>Data Points</a:t>
             </a:r>
-            <a:endParaRPr lang="en-US" b="1">
+            <a:endParaRPr lang="en-US" b="1" dirty="0">
               <a:cs typeface="Calibri"/>
             </a:endParaRPr>
           </a:p>
@@ -5520,10 +5604,10 @@
               <a:buChar char="•"/>
             </a:pPr>
             <a:r>
-              <a:rPr lang="en-US" sz="1400"/>
+              <a:rPr lang="en-US" sz="1400" dirty="0"/>
               <a:t>Qualitative data found</a:t>
             </a:r>
-            <a:endParaRPr lang="en-US" sz="1400">
+            <a:endParaRPr lang="en-US" sz="1400" dirty="0">
               <a:cs typeface="Calibri"/>
             </a:endParaRPr>
           </a:p>
@@ -5533,7 +5617,7 @@
               <a:buChar char="•"/>
             </a:pPr>
             <a:r>
-              <a:rPr lang="en-US" sz="1400">
+              <a:rPr lang="en-US" sz="1400" dirty="0">
                 <a:cs typeface="Calibri"/>
               </a:rPr>
               <a:t>Quantitative data found (source)</a:t>
@@ -5545,7 +5629,7 @@
               <a:buChar char="•"/>
             </a:pPr>
             <a:r>
-              <a:rPr lang="en-US" sz="1400">
+              <a:rPr lang="en-US" sz="1400" dirty="0">
                 <a:cs typeface="Calibri"/>
               </a:rPr>
               <a:t>Qualitative data found</a:t>
@@ -5557,7 +5641,7 @@
               <a:buChar char="•"/>
             </a:pPr>
             <a:r>
-              <a:rPr lang="en-US" sz="1400">
+              <a:rPr lang="en-US" sz="1400" dirty="0">
                 <a:cs typeface="Calibri"/>
               </a:rPr>
               <a:t>Quantitative data found (source)</a:t>
@@ -5568,20 +5652,20 @@
               <a:buFont typeface="Arial" panose="020B0604020202020204" pitchFamily="34" charset="0"/>
               <a:buChar char="•"/>
             </a:pPr>
-            <a:endParaRPr lang="en-US" sz="1400">
+            <a:endParaRPr lang="en-US" sz="1400" dirty="0">
               <a:cs typeface="Calibri"/>
             </a:endParaRPr>
           </a:p>
           <a:p>
             <a:r>
-              <a:rPr lang="en-US" b="1"/>
-              <a:t>Thresholds/Comparisons: </a:t>
-            </a:r>
-            <a:r>
-              <a:rPr lang="en-US"/>
+              <a:rPr lang="en-US" b="1" dirty="0"/>
+              <a:t>Thresholds/Comparisons </a:t>
+            </a:r>
+            <a:r>
+              <a:rPr lang="en-US" dirty="0"/>
               <a:t> </a:t>
             </a:r>
-            <a:endParaRPr lang="en-US">
+            <a:endParaRPr lang="en-US" dirty="0">
               <a:cs typeface="Calibri"/>
             </a:endParaRPr>
           </a:p>
@@ -5591,17 +5675,17 @@
               <a:buChar char="•"/>
             </a:pPr>
             <a:r>
-              <a:rPr lang="en-US" sz="1400">
+              <a:rPr lang="en-US" sz="1400" dirty="0">
                 <a:cs typeface="Calibri"/>
               </a:rPr>
               <a:t>Data found</a:t>
             </a:r>
           </a:p>
           <a:p>
-            <a:endParaRPr lang="en-US"/>
-          </a:p>
-          <a:p>
-            <a:endParaRPr lang="en-US"/>
+            <a:endParaRPr lang="en-US" dirty="0"/>
+          </a:p>
+          <a:p>
+            <a:endParaRPr lang="en-US" dirty="0"/>
           </a:p>
         </p:txBody>
       </p:sp>
@@ -6044,15 +6128,15 @@
           </a:bodyPr>
           <a:lstStyle/>
           <a:p>
-            <a:endParaRPr lang="en-US" sz="2400" b="1"/>
-          </a:p>
-          <a:p>
-            <a:endParaRPr lang="en-US" sz="2400" b="1"/>
+            <a:endParaRPr lang="en-US" sz="2400" b="1" dirty="0"/>
+          </a:p>
+          <a:p>
+            <a:endParaRPr lang="en-US" sz="2400" b="1" dirty="0"/>
           </a:p>
           <a:p>
             <a:pPr algn="ctr"/>
             <a:r>
-              <a:rPr lang="en-US" sz="2400" b="1">
+              <a:rPr lang="en-US" sz="2400" b="1" dirty="0">
                 <a:cs typeface="Calibri"/>
               </a:rPr>
               <a:t>Indicator </a:t>
@@ -6061,25 +6145,25 @@
           <a:p>
             <a:pPr algn="ctr"/>
             <a:r>
-              <a:rPr lang="en-US" sz="1400" i="1">
+              <a:rPr lang="en-US" sz="1400" i="1" dirty="0">
                 <a:ea typeface="+mn-lt"/>
                 <a:cs typeface="+mn-lt"/>
               </a:rPr>
               <a:t>Definition</a:t>
             </a:r>
-            <a:endParaRPr lang="en-US"/>
-          </a:p>
-          <a:p>
-            <a:endParaRPr lang="en-US" sz="1200">
+            <a:endParaRPr lang="en-US" dirty="0"/>
+          </a:p>
+          <a:p>
+            <a:endParaRPr lang="en-US" sz="1200" dirty="0">
               <a:cs typeface="Calibri"/>
             </a:endParaRPr>
           </a:p>
           <a:p>
             <a:r>
-              <a:rPr lang="en-US" b="1"/>
+              <a:rPr lang="en-US" b="1" dirty="0"/>
               <a:t>Data Points</a:t>
             </a:r>
-            <a:endParaRPr lang="en-US" b="1">
+            <a:endParaRPr lang="en-US" b="1" dirty="0">
               <a:cs typeface="Calibri"/>
             </a:endParaRPr>
           </a:p>
@@ -6089,10 +6173,10 @@
               <a:buChar char="•"/>
             </a:pPr>
             <a:r>
-              <a:rPr lang="en-US" sz="1400"/>
+              <a:rPr lang="en-US" sz="1400" dirty="0"/>
               <a:t>Qualitative data found</a:t>
             </a:r>
-            <a:endParaRPr lang="en-US" sz="1400">
+            <a:endParaRPr lang="en-US" sz="1400" dirty="0">
               <a:cs typeface="Calibri"/>
             </a:endParaRPr>
           </a:p>
@@ -6102,7 +6186,7 @@
               <a:buChar char="•"/>
             </a:pPr>
             <a:r>
-              <a:rPr lang="en-US" sz="1400">
+              <a:rPr lang="en-US" sz="1400" dirty="0">
                 <a:cs typeface="Calibri"/>
               </a:rPr>
               <a:t>Quantitative data found (source)</a:t>
@@ -6114,7 +6198,7 @@
               <a:buChar char="•"/>
             </a:pPr>
             <a:r>
-              <a:rPr lang="en-US" sz="1400">
+              <a:rPr lang="en-US" sz="1400" dirty="0">
                 <a:cs typeface="Calibri"/>
               </a:rPr>
               <a:t>Qualitative data found</a:t>
@@ -6126,7 +6210,7 @@
               <a:buChar char="•"/>
             </a:pPr>
             <a:r>
-              <a:rPr lang="en-US" sz="1400">
+              <a:rPr lang="en-US" sz="1400" dirty="0">
                 <a:cs typeface="Calibri"/>
               </a:rPr>
               <a:t>Quantitative data found (source)</a:t>
@@ -6137,20 +6221,20 @@
               <a:buFont typeface="Arial" panose="020B0604020202020204" pitchFamily="34" charset="0"/>
               <a:buChar char="•"/>
             </a:pPr>
-            <a:endParaRPr lang="en-US" sz="1400">
+            <a:endParaRPr lang="en-US" sz="1400" dirty="0">
               <a:cs typeface="Calibri"/>
             </a:endParaRPr>
           </a:p>
           <a:p>
             <a:r>
-              <a:rPr lang="en-US" b="1"/>
-              <a:t>Thresholds/Comparisons: </a:t>
-            </a:r>
-            <a:r>
-              <a:rPr lang="en-US"/>
+              <a:rPr lang="en-US" b="1" dirty="0"/>
+              <a:t>Thresholds/Comparisons </a:t>
+            </a:r>
+            <a:r>
+              <a:rPr lang="en-US" dirty="0"/>
               <a:t> </a:t>
             </a:r>
-            <a:endParaRPr lang="en-US">
+            <a:endParaRPr lang="en-US" dirty="0">
               <a:cs typeface="Calibri"/>
             </a:endParaRPr>
           </a:p>
@@ -6160,17 +6244,17 @@
               <a:buChar char="•"/>
             </a:pPr>
             <a:r>
-              <a:rPr lang="en-US" sz="1400">
+              <a:rPr lang="en-US" sz="1400" dirty="0">
                 <a:cs typeface="Calibri"/>
               </a:rPr>
               <a:t>Data found</a:t>
             </a:r>
           </a:p>
           <a:p>
-            <a:endParaRPr lang="en-US"/>
-          </a:p>
-          <a:p>
-            <a:endParaRPr lang="en-US"/>
+            <a:endParaRPr lang="en-US" dirty="0"/>
+          </a:p>
+          <a:p>
+            <a:endParaRPr lang="en-US" dirty="0"/>
           </a:p>
         </p:txBody>
       </p:sp>
@@ -6615,15 +6699,15 @@
           </a:bodyPr>
           <a:lstStyle/>
           <a:p>
-            <a:endParaRPr lang="en-US" sz="2400" b="1"/>
-          </a:p>
-          <a:p>
-            <a:endParaRPr lang="en-US" sz="2400" b="1"/>
+            <a:endParaRPr lang="en-US" sz="2400" b="1" dirty="0"/>
+          </a:p>
+          <a:p>
+            <a:endParaRPr lang="en-US" sz="2400" b="1" dirty="0"/>
           </a:p>
           <a:p>
             <a:pPr algn="ctr"/>
             <a:r>
-              <a:rPr lang="en-US" sz="2400" b="1">
+              <a:rPr lang="en-US" sz="2400" b="1" dirty="0">
                 <a:cs typeface="Calibri"/>
               </a:rPr>
               <a:t>Indicator </a:t>
@@ -6632,25 +6716,25 @@
           <a:p>
             <a:pPr algn="ctr"/>
             <a:r>
-              <a:rPr lang="en-US" sz="1400" i="1">
+              <a:rPr lang="en-US" sz="1400" i="1" dirty="0">
                 <a:ea typeface="+mn-lt"/>
                 <a:cs typeface="+mn-lt"/>
               </a:rPr>
               <a:t>Definition</a:t>
             </a:r>
-            <a:endParaRPr lang="en-US"/>
-          </a:p>
-          <a:p>
-            <a:endParaRPr lang="en-US" sz="1200">
+            <a:endParaRPr lang="en-US" dirty="0"/>
+          </a:p>
+          <a:p>
+            <a:endParaRPr lang="en-US" sz="1200" dirty="0">
               <a:cs typeface="Calibri"/>
             </a:endParaRPr>
           </a:p>
           <a:p>
             <a:r>
-              <a:rPr lang="en-US" b="1"/>
+              <a:rPr lang="en-US" b="1" dirty="0"/>
               <a:t>Data Points</a:t>
             </a:r>
-            <a:endParaRPr lang="en-US" b="1">
+            <a:endParaRPr lang="en-US" b="1" dirty="0">
               <a:cs typeface="Calibri"/>
             </a:endParaRPr>
           </a:p>
@@ -6660,10 +6744,10 @@
               <a:buChar char="•"/>
             </a:pPr>
             <a:r>
-              <a:rPr lang="en-US" sz="1400"/>
+              <a:rPr lang="en-US" sz="1400" dirty="0"/>
               <a:t>Qualitative data found</a:t>
             </a:r>
-            <a:endParaRPr lang="en-US" sz="1400">
+            <a:endParaRPr lang="en-US" sz="1400" dirty="0">
               <a:cs typeface="Calibri"/>
             </a:endParaRPr>
           </a:p>
@@ -6673,7 +6757,7 @@
               <a:buChar char="•"/>
             </a:pPr>
             <a:r>
-              <a:rPr lang="en-US" sz="1400">
+              <a:rPr lang="en-US" sz="1400" dirty="0">
                 <a:cs typeface="Calibri"/>
               </a:rPr>
               <a:t>Quantitative data found (source)</a:t>
@@ -6685,7 +6769,7 @@
               <a:buChar char="•"/>
             </a:pPr>
             <a:r>
-              <a:rPr lang="en-US" sz="1400">
+              <a:rPr lang="en-US" sz="1400" dirty="0">
                 <a:cs typeface="Calibri"/>
               </a:rPr>
               <a:t>Qualitative data found</a:t>
@@ -6697,7 +6781,7 @@
               <a:buChar char="•"/>
             </a:pPr>
             <a:r>
-              <a:rPr lang="en-US" sz="1400">
+              <a:rPr lang="en-US" sz="1400" dirty="0">
                 <a:cs typeface="Calibri"/>
               </a:rPr>
               <a:t>Quantitative data found (source)</a:t>
@@ -6708,20 +6792,20 @@
               <a:buFont typeface="Arial" panose="020B0604020202020204" pitchFamily="34" charset="0"/>
               <a:buChar char="•"/>
             </a:pPr>
-            <a:endParaRPr lang="en-US" sz="1400">
+            <a:endParaRPr lang="en-US" sz="1400" dirty="0">
               <a:cs typeface="Calibri"/>
             </a:endParaRPr>
           </a:p>
           <a:p>
             <a:r>
-              <a:rPr lang="en-US" b="1"/>
-              <a:t>Thresholds/Comparisons: </a:t>
-            </a:r>
-            <a:r>
-              <a:rPr lang="en-US"/>
+              <a:rPr lang="en-US" b="1" dirty="0"/>
+              <a:t>Thresholds/Comparisons </a:t>
+            </a:r>
+            <a:r>
+              <a:rPr lang="en-US" dirty="0"/>
               <a:t> </a:t>
             </a:r>
-            <a:endParaRPr lang="en-US">
+            <a:endParaRPr lang="en-US" dirty="0">
               <a:cs typeface="Calibri"/>
             </a:endParaRPr>
           </a:p>
@@ -6731,17 +6815,17 @@
               <a:buChar char="•"/>
             </a:pPr>
             <a:r>
-              <a:rPr lang="en-US" sz="1400">
+              <a:rPr lang="en-US" sz="1400" dirty="0">
                 <a:cs typeface="Calibri"/>
               </a:rPr>
               <a:t>Data found</a:t>
             </a:r>
           </a:p>
           <a:p>
-            <a:endParaRPr lang="en-US"/>
-          </a:p>
-          <a:p>
-            <a:endParaRPr lang="en-US"/>
+            <a:endParaRPr lang="en-US" dirty="0"/>
+          </a:p>
+          <a:p>
+            <a:endParaRPr lang="en-US" dirty="0"/>
           </a:p>
         </p:txBody>
       </p:sp>
@@ -7186,20 +7270,20 @@
           </a:bodyPr>
           <a:lstStyle/>
           <a:p>
-            <a:endParaRPr lang="en-US" sz="2400" b="1"/>
-          </a:p>
-          <a:p>
-            <a:endParaRPr lang="en-US" sz="2400" b="1"/>
+            <a:endParaRPr lang="en-US" sz="2400" b="1" dirty="0"/>
+          </a:p>
+          <a:p>
+            <a:endParaRPr lang="en-US" sz="2400" b="1" dirty="0"/>
           </a:p>
           <a:p>
             <a:pPr algn="ctr"/>
             <a:r>
-              <a:rPr lang="en-US" sz="2400" b="1">
+              <a:rPr lang="en-US" sz="2400" b="1" dirty="0">
                 <a:cs typeface="Calibri"/>
               </a:rPr>
               <a:t>Proximity to </a:t>
             </a:r>
-            <a:endParaRPr lang="en-US" sz="2400" b="1">
+            <a:endParaRPr lang="en-US" sz="2400" b="1" dirty="0">
               <a:ea typeface="Calibri"/>
               <a:cs typeface="Calibri"/>
             </a:endParaRPr>
@@ -7207,12 +7291,12 @@
           <a:p>
             <a:pPr algn="ctr"/>
             <a:r>
-              <a:rPr lang="en-US" sz="2400" b="1">
+              <a:rPr lang="en-US" sz="2400" b="1" dirty="0">
                 <a:cs typeface="Calibri"/>
               </a:rPr>
               <a:t>Superfund Sites</a:t>
             </a:r>
-            <a:endParaRPr lang="en-US" sz="2400" b="1">
+            <a:endParaRPr lang="en-US" sz="2400" b="1" dirty="0">
               <a:ea typeface="Calibri"/>
               <a:cs typeface="Calibri"/>
             </a:endParaRPr>
@@ -7220,32 +7304,32 @@
           <a:p>
             <a:pPr algn="ctr"/>
             <a:r>
-              <a:rPr lang="en-US" sz="1400" i="1">
+              <a:rPr lang="en-US" sz="1400" i="1" dirty="0">
                 <a:ea typeface="+mn-lt"/>
                 <a:cs typeface="+mn-lt"/>
               </a:rPr>
               <a:t>The number and condition of Superfund sites within or in close proximity to the community.</a:t>
             </a:r>
             <a:r>
-              <a:rPr lang="en-US" sz="1400">
+              <a:rPr lang="en-US" sz="1400" dirty="0">
                 <a:ea typeface="+mn-lt"/>
                 <a:cs typeface="+mn-lt"/>
               </a:rPr>
               <a:t> </a:t>
             </a:r>
-            <a:endParaRPr lang="en-US"/>
-          </a:p>
-          <a:p>
-            <a:endParaRPr lang="en-US" sz="1200">
+            <a:endParaRPr lang="en-US" dirty="0"/>
+          </a:p>
+          <a:p>
+            <a:endParaRPr lang="en-US" sz="1200" dirty="0">
               <a:cs typeface="Calibri"/>
             </a:endParaRPr>
           </a:p>
           <a:p>
             <a:r>
-              <a:rPr lang="en-US" b="1"/>
+              <a:rPr lang="en-US" b="1" dirty="0"/>
               <a:t>Data Points</a:t>
             </a:r>
-            <a:endParaRPr lang="en-US" b="1">
+            <a:endParaRPr lang="en-US" b="1" dirty="0">
               <a:cs typeface="Calibri"/>
             </a:endParaRPr>
           </a:p>
@@ -7255,10 +7339,10 @@
               <a:buChar char="•"/>
             </a:pPr>
             <a:r>
-              <a:rPr lang="en-US" sz="1400"/>
+              <a:rPr lang="en-US" sz="1400" dirty="0"/>
               <a:t># of sites (discussions with EPA officials)</a:t>
             </a:r>
-            <a:endParaRPr lang="en-US" sz="1400">
+            <a:endParaRPr lang="en-US" sz="1400" dirty="0">
               <a:cs typeface="Calibri"/>
             </a:endParaRPr>
           </a:p>
@@ -7268,7 +7352,7 @@
               <a:buChar char="•"/>
             </a:pPr>
             <a:r>
-              <a:rPr lang="en-US" sz="1400"/>
+              <a:rPr lang="en-US" sz="1400" dirty="0"/>
               <a:t>Contaminants of concern (discussions with EPA officials)</a:t>
             </a:r>
           </a:p>
@@ -7278,12 +7362,12 @@
               <a:buChar char="•"/>
             </a:pPr>
             <a:r>
-              <a:rPr lang="en-US" sz="1400">
+              <a:rPr lang="en-US" sz="1400" dirty="0">
                 <a:cs typeface="Calibri"/>
               </a:rPr>
               <a:t>[community input from workshops]</a:t>
             </a:r>
-            <a:endParaRPr lang="en-US" sz="1400">
+            <a:endParaRPr lang="en-US" sz="1400" dirty="0">
               <a:ea typeface="Calibri"/>
               <a:cs typeface="Calibri"/>
             </a:endParaRPr>
@@ -7294,12 +7378,12 @@
               <a:buChar char="•"/>
             </a:pPr>
             <a:r>
-              <a:rPr lang="en-US" sz="1400">
+              <a:rPr lang="en-US" sz="1400" dirty="0">
                 <a:cs typeface="Calibri"/>
               </a:rPr>
               <a:t># of people work at this site</a:t>
             </a:r>
-            <a:endParaRPr lang="en-US" sz="1400">
+            <a:endParaRPr lang="en-US" sz="1400" dirty="0">
               <a:ea typeface="Calibri"/>
               <a:cs typeface="Calibri"/>
             </a:endParaRPr>
@@ -7310,12 +7394,12 @@
               <a:buChar char="•"/>
             </a:pPr>
             <a:r>
-              <a:rPr lang="en-US" sz="1400">
+              <a:rPr lang="en-US" sz="1400" dirty="0">
                 <a:cs typeface="Calibri"/>
               </a:rPr>
-              <a:t>Condition of the site, i.e. where at in the clean-up process </a:t>
-            </a:r>
-            <a:endParaRPr lang="en-US" sz="1400">
+              <a:t>Condition of the site, i.e., where at in the clean-up process </a:t>
+            </a:r>
+            <a:endParaRPr lang="en-US" sz="1400" dirty="0">
               <a:ea typeface="Calibri"/>
               <a:cs typeface="Calibri"/>
             </a:endParaRPr>
@@ -7325,20 +7409,20 @@
               <a:buFont typeface="Arial" panose="020B0604020202020204" pitchFamily="34" charset="0"/>
               <a:buChar char="•"/>
             </a:pPr>
-            <a:endParaRPr lang="en-US" sz="1400">
+            <a:endParaRPr lang="en-US" sz="1400" dirty="0">
               <a:cs typeface="Calibri"/>
             </a:endParaRPr>
           </a:p>
           <a:p>
             <a:r>
-              <a:rPr lang="en-US" b="1"/>
-              <a:t>Thresholds/Comparisons: </a:t>
-            </a:r>
-            <a:r>
-              <a:rPr lang="en-US"/>
+              <a:rPr lang="en-US" b="1" dirty="0"/>
+              <a:t>Thresholds/Comparisons </a:t>
+            </a:r>
+            <a:r>
+              <a:rPr lang="en-US" dirty="0"/>
               <a:t> </a:t>
             </a:r>
-            <a:endParaRPr lang="en-US">
+            <a:endParaRPr lang="en-US" dirty="0">
               <a:cs typeface="Calibri"/>
             </a:endParaRPr>
           </a:p>
@@ -7348,12 +7432,12 @@
               <a:buChar char="•"/>
             </a:pPr>
             <a:r>
-              <a:rPr lang="en-US" sz="1400">
+              <a:rPr lang="en-US" sz="1400" dirty="0">
                 <a:cs typeface="Calibri"/>
               </a:rPr>
               <a:t>XX percentile Superfund Proximity (EJ Screen)</a:t>
             </a:r>
-            <a:endParaRPr lang="en-US" sz="1400">
+            <a:endParaRPr lang="en-US" sz="1400" dirty="0">
               <a:ea typeface="Calibri"/>
               <a:cs typeface="Calibri"/>
             </a:endParaRPr>
@@ -7364,12 +7448,12 @@
               <a:buChar char="•"/>
             </a:pPr>
             <a:r>
-              <a:rPr lang="en-US" sz="1400">
+              <a:rPr lang="en-US" sz="1400" dirty="0">
                 <a:cs typeface="Calibri"/>
               </a:rPr>
               <a:t>XX percentile low income (EJ Screen)</a:t>
             </a:r>
-            <a:endParaRPr lang="en-US" sz="1400"/>
+            <a:endParaRPr lang="en-US" sz="1400" dirty="0"/>
           </a:p>
           <a:p>
             <a:pPr marL="285750" indent="-285750">
@@ -7377,23 +7461,23 @@
               <a:buChar char="•"/>
             </a:pPr>
             <a:r>
-              <a:rPr lang="en-US" sz="1400">
+              <a:rPr lang="en-US" sz="1400" dirty="0">
                 <a:cs typeface="Calibri"/>
               </a:rPr>
               <a:t>XX percentile people of color (EJ Screen)</a:t>
             </a:r>
-            <a:endParaRPr lang="en-US" sz="1400"/>
-          </a:p>
-          <a:p>
-            <a:endParaRPr lang="en-US" sz="1400">
+            <a:endParaRPr lang="en-US" sz="1400" dirty="0"/>
+          </a:p>
+          <a:p>
+            <a:endParaRPr lang="en-US" sz="1400" dirty="0">
               <a:cs typeface="Calibri"/>
             </a:endParaRPr>
           </a:p>
           <a:p>
-            <a:endParaRPr lang="en-US"/>
-          </a:p>
-          <a:p>
-            <a:endParaRPr lang="en-US"/>
+            <a:endParaRPr lang="en-US" dirty="0"/>
+          </a:p>
+          <a:p>
+            <a:endParaRPr lang="en-US" dirty="0"/>
           </a:p>
         </p:txBody>
       </p:sp>
@@ -8015,20 +8099,20 @@
           </a:bodyPr>
           <a:lstStyle/>
           <a:p>
-            <a:endParaRPr lang="en-US" sz="2400" b="1"/>
-          </a:p>
-          <a:p>
-            <a:endParaRPr lang="en-US" sz="2400" b="1"/>
+            <a:endParaRPr lang="en-US" sz="2400" b="1" dirty="0"/>
+          </a:p>
+          <a:p>
+            <a:endParaRPr lang="en-US" sz="2400" b="1" dirty="0"/>
           </a:p>
           <a:p>
             <a:pPr algn="ctr"/>
             <a:r>
-              <a:rPr lang="en-US" sz="2400" b="1">
+              <a:rPr lang="en-US" sz="2400" b="1" dirty="0">
                 <a:cs typeface="Calibri"/>
               </a:rPr>
               <a:t>Proximity to </a:t>
             </a:r>
-            <a:endParaRPr lang="en-US" sz="2400" b="1">
+            <a:endParaRPr lang="en-US" sz="2400" b="1" dirty="0">
               <a:ea typeface="Calibri"/>
               <a:cs typeface="Calibri"/>
             </a:endParaRPr>
@@ -8036,12 +8120,12 @@
           <a:p>
             <a:pPr algn="ctr"/>
             <a:r>
-              <a:rPr lang="en-US" sz="2400" b="1">
+              <a:rPr lang="en-US" sz="2400" b="1" dirty="0">
                 <a:cs typeface="Calibri"/>
               </a:rPr>
               <a:t>Superfund Sites</a:t>
             </a:r>
-            <a:endParaRPr lang="en-US" sz="2400" b="1">
+            <a:endParaRPr lang="en-US" sz="2400" b="1" dirty="0">
               <a:ea typeface="Calibri"/>
               <a:cs typeface="Calibri"/>
             </a:endParaRPr>
@@ -8049,32 +8133,32 @@
           <a:p>
             <a:pPr algn="ctr"/>
             <a:r>
-              <a:rPr lang="en-US" sz="1400" i="1">
+              <a:rPr lang="en-US" sz="1400" i="1" dirty="0">
                 <a:ea typeface="+mn-lt"/>
                 <a:cs typeface="+mn-lt"/>
               </a:rPr>
               <a:t>The number and condition of Superfund sites within or in close proximity to the community.</a:t>
             </a:r>
             <a:r>
-              <a:rPr lang="en-US" sz="1400">
+              <a:rPr lang="en-US" sz="1400" dirty="0">
                 <a:ea typeface="+mn-lt"/>
                 <a:cs typeface="+mn-lt"/>
               </a:rPr>
               <a:t> </a:t>
             </a:r>
-            <a:endParaRPr lang="en-US"/>
-          </a:p>
-          <a:p>
-            <a:endParaRPr lang="en-US" sz="1200">
+            <a:endParaRPr lang="en-US" dirty="0"/>
+          </a:p>
+          <a:p>
+            <a:endParaRPr lang="en-US" sz="1200" dirty="0">
               <a:cs typeface="Calibri"/>
             </a:endParaRPr>
           </a:p>
           <a:p>
             <a:r>
-              <a:rPr lang="en-US" b="1"/>
+              <a:rPr lang="en-US" b="1" dirty="0"/>
               <a:t>Data Points</a:t>
             </a:r>
-            <a:endParaRPr lang="en-US" b="1">
+            <a:endParaRPr lang="en-US" b="1" dirty="0">
               <a:cs typeface="Calibri"/>
             </a:endParaRPr>
           </a:p>
@@ -8084,10 +8168,10 @@
               <a:buChar char="•"/>
             </a:pPr>
             <a:r>
-              <a:rPr lang="en-US" sz="1400"/>
+              <a:rPr lang="en-US" sz="1400" dirty="0"/>
               <a:t># of sites (discussions with EPA officials)</a:t>
             </a:r>
-            <a:endParaRPr lang="en-US" sz="1400">
+            <a:endParaRPr lang="en-US" sz="1400" dirty="0">
               <a:cs typeface="Calibri"/>
             </a:endParaRPr>
           </a:p>
@@ -8097,7 +8181,7 @@
               <a:buChar char="•"/>
             </a:pPr>
             <a:r>
-              <a:rPr lang="en-US" sz="1400"/>
+              <a:rPr lang="en-US" sz="1400" dirty="0"/>
               <a:t>Contaminants of concern (discussions with EPA officials)</a:t>
             </a:r>
           </a:p>
@@ -8107,12 +8191,12 @@
               <a:buChar char="•"/>
             </a:pPr>
             <a:r>
-              <a:rPr lang="en-US" sz="1400">
+              <a:rPr lang="en-US" sz="1400" dirty="0">
                 <a:cs typeface="Calibri"/>
               </a:rPr>
               <a:t>[community input from workshops]</a:t>
             </a:r>
-            <a:endParaRPr lang="en-US" sz="1400">
+            <a:endParaRPr lang="en-US" sz="1400" dirty="0">
               <a:ea typeface="Calibri"/>
               <a:cs typeface="Calibri"/>
             </a:endParaRPr>
@@ -8123,12 +8207,12 @@
               <a:buChar char="•"/>
             </a:pPr>
             <a:r>
-              <a:rPr lang="en-US" sz="1400">
+              <a:rPr lang="en-US" sz="1400" dirty="0">
                 <a:cs typeface="Calibri"/>
               </a:rPr>
               <a:t># of people work at this site</a:t>
             </a:r>
-            <a:endParaRPr lang="en-US" sz="1400">
+            <a:endParaRPr lang="en-US" sz="1400" dirty="0">
               <a:ea typeface="Calibri"/>
               <a:cs typeface="Calibri"/>
             </a:endParaRPr>
@@ -8139,12 +8223,12 @@
               <a:buChar char="•"/>
             </a:pPr>
             <a:r>
-              <a:rPr lang="en-US" sz="1400">
+              <a:rPr lang="en-US" sz="1400" dirty="0">
                 <a:cs typeface="Calibri"/>
               </a:rPr>
-              <a:t>Condition of the site, i.e. where at in the clean-up process </a:t>
-            </a:r>
-            <a:endParaRPr lang="en-US" sz="1400">
+              <a:t>Condition of the site, i.e., where at in the clean-up process </a:t>
+            </a:r>
+            <a:endParaRPr lang="en-US" sz="1400" dirty="0">
               <a:ea typeface="Calibri"/>
               <a:cs typeface="Calibri"/>
             </a:endParaRPr>
@@ -8154,20 +8238,20 @@
               <a:buFont typeface="Arial" panose="020B0604020202020204" pitchFamily="34" charset="0"/>
               <a:buChar char="•"/>
             </a:pPr>
-            <a:endParaRPr lang="en-US" sz="1400">
+            <a:endParaRPr lang="en-US" sz="1400" dirty="0">
               <a:cs typeface="Calibri"/>
             </a:endParaRPr>
           </a:p>
           <a:p>
             <a:r>
-              <a:rPr lang="en-US" b="1"/>
-              <a:t>Thresholds/Comparisons: </a:t>
-            </a:r>
-            <a:r>
-              <a:rPr lang="en-US"/>
+              <a:rPr lang="en-US" b="1" dirty="0"/>
+              <a:t>Thresholds/Comparisons </a:t>
+            </a:r>
+            <a:r>
+              <a:rPr lang="en-US" dirty="0"/>
               <a:t> </a:t>
             </a:r>
-            <a:endParaRPr lang="en-US">
+            <a:endParaRPr lang="en-US" dirty="0">
               <a:cs typeface="Calibri"/>
             </a:endParaRPr>
           </a:p>
@@ -8177,12 +8261,12 @@
               <a:buChar char="•"/>
             </a:pPr>
             <a:r>
-              <a:rPr lang="en-US" sz="1400">
+              <a:rPr lang="en-US" sz="1400" dirty="0">
                 <a:cs typeface="Calibri"/>
               </a:rPr>
               <a:t>XX percentile Superfund Proximity (EJ Screen)</a:t>
             </a:r>
-            <a:endParaRPr lang="en-US" sz="1400">
+            <a:endParaRPr lang="en-US" sz="1400" dirty="0">
               <a:ea typeface="Calibri"/>
               <a:cs typeface="Calibri"/>
             </a:endParaRPr>
@@ -8193,12 +8277,12 @@
               <a:buChar char="•"/>
             </a:pPr>
             <a:r>
-              <a:rPr lang="en-US" sz="1400">
+              <a:rPr lang="en-US" sz="1400" dirty="0">
                 <a:cs typeface="Calibri"/>
               </a:rPr>
               <a:t>XX percentile low income (EJ Screen)</a:t>
             </a:r>
-            <a:endParaRPr lang="en-US" sz="1400"/>
+            <a:endParaRPr lang="en-US" sz="1400" dirty="0"/>
           </a:p>
           <a:p>
             <a:pPr marL="285750" indent="-285750">
@@ -8206,23 +8290,23 @@
               <a:buChar char="•"/>
             </a:pPr>
             <a:r>
-              <a:rPr lang="en-US" sz="1400">
+              <a:rPr lang="en-US" sz="1400" dirty="0">
                 <a:cs typeface="Calibri"/>
               </a:rPr>
               <a:t>XX percentile people of color (EJ Screen)</a:t>
             </a:r>
-            <a:endParaRPr lang="en-US" sz="1400"/>
-          </a:p>
-          <a:p>
-            <a:endParaRPr lang="en-US" sz="1400">
+            <a:endParaRPr lang="en-US" sz="1400" dirty="0"/>
+          </a:p>
+          <a:p>
+            <a:endParaRPr lang="en-US" sz="1400" dirty="0">
               <a:cs typeface="Calibri"/>
             </a:endParaRPr>
           </a:p>
           <a:p>
-            <a:endParaRPr lang="en-US"/>
-          </a:p>
-          <a:p>
-            <a:endParaRPr lang="en-US"/>
+            <a:endParaRPr lang="en-US" dirty="0"/>
+          </a:p>
+          <a:p>
+            <a:endParaRPr lang="en-US" dirty="0"/>
           </a:p>
         </p:txBody>
       </p:sp>
@@ -9425,12 +9509,54 @@
 </file>
 
 <file path=customXml/item1.xml><?xml version="1.0" encoding="utf-8"?>
-<?mso-contentType ?>
-<FormTemplates xmlns="http://schemas.microsoft.com/sharepoint/v3/contenttype/forms">
-  <Display>DocumentLibraryForm</Display>
-  <Edit>DocumentLibraryForm</Edit>
-  <New>DocumentLibraryForm</New>
-</FormTemplates>
+<p:properties xmlns:p="http://schemas.microsoft.com/office/2006/metadata/properties" xmlns:xsi="http://www.w3.org/2001/XMLSchema-instance" xmlns:pc="http://schemas.microsoft.com/office/infopath/2007/PartnerControls">
+  <documentManagement>
+    <SharedWithUsers xmlns="8f0ccb0b-2b45-4ecf-807d-d8fd9145fac4">
+      <UserInfo>
+        <DisplayName/>
+        <AccountId xsi:nil="true"/>
+        <AccountType/>
+      </UserInfo>
+    </SharedWithUsers>
+    <_Source xmlns="http://schemas.microsoft.com/sharepoint/v3/fields" xsi:nil="true"/>
+    <Language xmlns="http://schemas.microsoft.com/sharepoint/v3">English</Language>
+    <_ip_UnifiedCompliancePolicyUIAction xmlns="http://schemas.microsoft.com/sharepoint/v3" xsi:nil="true"/>
+    <j747ac98061d40f0aa7bd47e1db5675d xmlns="4ffa91fb-a0ff-4ac5-b2db-65c790d184a4">
+      <Terms xmlns="http://schemas.microsoft.com/office/infopath/2007/PartnerControls"/>
+    </j747ac98061d40f0aa7bd47e1db5675d>
+    <lcf76f155ced4ddcb4097134ff3c332f xmlns="c3fe2bc6-81ec-4aad-a296-b74ae9f31a66">
+      <Terms xmlns="http://schemas.microsoft.com/office/infopath/2007/PartnerControls"/>
+    </lcf76f155ced4ddcb4097134ff3c332f>
+    <External_x0020_Contributor xmlns="4ffa91fb-a0ff-4ac5-b2db-65c790d184a4" xsi:nil="true"/>
+    <TaxKeywordTaxHTField xmlns="4ffa91fb-a0ff-4ac5-b2db-65c790d184a4">
+      <Terms xmlns="http://schemas.microsoft.com/office/infopath/2007/PartnerControls"/>
+    </TaxKeywordTaxHTField>
+    <Record xmlns="4ffa91fb-a0ff-4ac5-b2db-65c790d184a4">Shared</Record>
+    <_ip_UnifiedCompliancePolicyProperties xmlns="http://schemas.microsoft.com/sharepoint/v3" xsi:nil="true"/>
+    <Rights xmlns="4ffa91fb-a0ff-4ac5-b2db-65c790d184a4" xsi:nil="true"/>
+    <Document_x0020_Creation_x0020_Date xmlns="4ffa91fb-a0ff-4ac5-b2db-65c790d184a4">2023-06-16T17:31:38+00:00</Document_x0020_Creation_x0020_Date>
+    <EPA_x0020_Office xmlns="4ffa91fb-a0ff-4ac5-b2db-65c790d184a4" xsi:nil="true"/>
+    <CategoryDescription xmlns="http://schemas.microsoft.com/sharepoint.v3" xsi:nil="true"/>
+    <Identifier xmlns="4ffa91fb-a0ff-4ac5-b2db-65c790d184a4" xsi:nil="true"/>
+    <_Coverage xmlns="http://schemas.microsoft.com/sharepoint/v3/fields" xsi:nil="true"/>
+    <Creator xmlns="4ffa91fb-a0ff-4ac5-b2db-65c790d184a4">
+      <UserInfo>
+        <DisplayName/>
+        <AccountId xsi:nil="true"/>
+        <AccountType/>
+      </UserInfo>
+    </Creator>
+    <EPA_x0020_Related_x0020_Documents xmlns="4ffa91fb-a0ff-4ac5-b2db-65c790d184a4" xsi:nil="true"/>
+    <EPA_x0020_Contributor xmlns="4ffa91fb-a0ff-4ac5-b2db-65c790d184a4">
+      <UserInfo>
+        <DisplayName/>
+        <AccountId xsi:nil="true"/>
+        <AccountType/>
+      </UserInfo>
+    </EPA_x0020_Contributor>
+    <TaxCatchAll xmlns="4ffa91fb-a0ff-4ac5-b2db-65c790d184a4" xsi:nil="true"/>
+  </documentManagement>
+</p:properties>
 </file>
 
 <file path=customXml/item2.xml><?xml version="1.0" encoding="utf-8"?>
@@ -9885,47 +10011,12 @@
 </file>
 
 <file path=customXml/item3.xml><?xml version="1.0" encoding="utf-8"?>
-<p:properties xmlns:p="http://schemas.microsoft.com/office/2006/metadata/properties" xmlns:xsi="http://www.w3.org/2001/XMLSchema-instance" xmlns:pc="http://schemas.microsoft.com/office/infopath/2007/PartnerControls">
-  <documentManagement>
-    <_Coverage xmlns="http://schemas.microsoft.com/sharepoint/v3/fields" xsi:nil="true"/>
-    <Record xmlns="4ffa91fb-a0ff-4ac5-b2db-65c790d184a4">Shared</Record>
-    <EPA_x0020_Office xmlns="4ffa91fb-a0ff-4ac5-b2db-65c790d184a4" xsi:nil="true"/>
-    <Document_x0020_Creation_x0020_Date xmlns="4ffa91fb-a0ff-4ac5-b2db-65c790d184a4">2023-04-11T08:24:54+00:00</Document_x0020_Creation_x0020_Date>
-    <EPA_x0020_Related_x0020_Documents xmlns="4ffa91fb-a0ff-4ac5-b2db-65c790d184a4" xsi:nil="true"/>
-    <_Source xmlns="http://schemas.microsoft.com/sharepoint/v3/fields" xsi:nil="true"/>
-    <CategoryDescription xmlns="http://schemas.microsoft.com/sharepoint.v3" xsi:nil="true"/>
-    <EPA_x0020_Contributor xmlns="4ffa91fb-a0ff-4ac5-b2db-65c790d184a4">
-      <UserInfo>
-        <DisplayName/>
-        <AccountId xsi:nil="true"/>
-        <AccountType/>
-      </UserInfo>
-    </EPA_x0020_Contributor>
-    <lcf76f155ced4ddcb4097134ff3c332f xmlns="c3fe2bc6-81ec-4aad-a296-b74ae9f31a66">
-      <Terms xmlns="http://schemas.microsoft.com/office/infopath/2007/PartnerControls"/>
-    </lcf76f155ced4ddcb4097134ff3c332f>
-    <TaxCatchAll xmlns="4ffa91fb-a0ff-4ac5-b2db-65c790d184a4" xsi:nil="true"/>
-    <TaxKeywordTaxHTField xmlns="4ffa91fb-a0ff-4ac5-b2db-65c790d184a4">
-      <Terms xmlns="http://schemas.microsoft.com/office/infopath/2007/PartnerControls"/>
-    </TaxKeywordTaxHTField>
-    <Rights xmlns="4ffa91fb-a0ff-4ac5-b2db-65c790d184a4" xsi:nil="true"/>
-    <External_x0020_Contributor xmlns="4ffa91fb-a0ff-4ac5-b2db-65c790d184a4" xsi:nil="true"/>
-    <Identifier xmlns="4ffa91fb-a0ff-4ac5-b2db-65c790d184a4" xsi:nil="true"/>
-    <_ip_UnifiedCompliancePolicyUIAction xmlns="http://schemas.microsoft.com/sharepoint/v3" xsi:nil="true"/>
-    <Creator xmlns="4ffa91fb-a0ff-4ac5-b2db-65c790d184a4">
-      <UserInfo>
-        <DisplayName/>
-        <AccountId xsi:nil="true"/>
-        <AccountType/>
-      </UserInfo>
-    </Creator>
-    <_ip_UnifiedCompliancePolicyProperties xmlns="http://schemas.microsoft.com/sharepoint/v3" xsi:nil="true"/>
-    <Language xmlns="http://schemas.microsoft.com/sharepoint/v3">English</Language>
-    <j747ac98061d40f0aa7bd47e1db5675d xmlns="4ffa91fb-a0ff-4ac5-b2db-65c790d184a4">
-      <Terms xmlns="http://schemas.microsoft.com/office/infopath/2007/PartnerControls"/>
-    </j747ac98061d40f0aa7bd47e1db5675d>
-  </documentManagement>
-</p:properties>
+<?mso-contentType ?>
+<FormTemplates xmlns="http://schemas.microsoft.com/sharepoint/v3/contenttype/forms">
+  <Display>DocumentLibraryForm</Display>
+  <Edit>DocumentLibraryForm</Edit>
+  <New>DocumentLibraryForm</New>
+</FormTemplates>
 </file>
 
 <file path=customXml/item4.xml><?xml version="1.0" encoding="utf-8"?>
@@ -9934,6 +10025,27 @@
 </file>
 
 <file path=customXml/itemProps1.xml><?xml version="1.0" encoding="utf-8"?>
+<ds:datastoreItem xmlns:ds="http://schemas.openxmlformats.org/officeDocument/2006/customXml" ds:itemID="{56B508E7-632F-46DC-BEB4-3727DC3FD51D}">
+  <ds:schemaRefs>
+    <ds:schemaRef ds:uri="http://schemas.microsoft.com/office/2006/metadata/properties"/>
+    <ds:schemaRef ds:uri="http://purl.org/dc/elements/1.1/"/>
+    <ds:schemaRef ds:uri="http://www.w3.org/XML/1998/namespace"/>
+    <ds:schemaRef ds:uri="http://schemas.openxmlformats.org/package/2006/metadata/core-properties"/>
+    <ds:schemaRef ds:uri="http://schemas.microsoft.com/office/2006/documentManagement/types"/>
+    <ds:schemaRef ds:uri="http://purl.org/dc/terms/"/>
+    <ds:schemaRef ds:uri="http://schemas.microsoft.com/office/infopath/2007/PartnerControls"/>
+    <ds:schemaRef ds:uri="6abd40b1-255a-4c6d-9f51-0ab055223958"/>
+    <ds:schemaRef ds:uri="782bd00c-d0de-45eb-9b7b-c6eb022f2513"/>
+    <ds:schemaRef ds:uri="http://purl.org/dc/dcmitype/"/>
+  </ds:schemaRefs>
+</ds:datastoreItem>
+</file>
+
+<file path=customXml/itemProps2.xml><?xml version="1.0" encoding="utf-8"?>
+<ds:datastoreItem xmlns:ds="http://schemas.openxmlformats.org/officeDocument/2006/customXml" ds:itemID="{1528E0A2-0F02-48B8-9D98-7C5850D5D456}"/>
+</file>
+
+<file path=customXml/itemProps3.xml><?xml version="1.0" encoding="utf-8"?>
 <ds:datastoreItem xmlns:ds="http://schemas.openxmlformats.org/officeDocument/2006/customXml" ds:itemID="{E1457DDF-9C17-465E-BEBC-C1A822ADDEAA}">
   <ds:schemaRefs>
     <ds:schemaRef ds:uri="http://schemas.microsoft.com/sharepoint/v3/contenttype/forms"/>
@@ -9941,54 +10053,6 @@
 </ds:datastoreItem>
 </file>
 
-<file path=customXml/itemProps2.xml><?xml version="1.0" encoding="utf-8"?>
-<ds:datastoreItem xmlns:ds="http://schemas.openxmlformats.org/officeDocument/2006/customXml" ds:itemID="{71EFFE12-A48A-4D51-83A8-4A8E7752E91D}">
-  <ds:schemaRefs>
-    <ds:schemaRef ds:uri="4ffa91fb-a0ff-4ac5-b2db-65c790d184a4"/>
-    <ds:schemaRef ds:uri="8f0ccb0b-2b45-4ecf-807d-d8fd9145fac4"/>
-    <ds:schemaRef ds:uri="c3fe2bc6-81ec-4aad-a296-b74ae9f31a66"/>
-    <ds:schemaRef ds:uri="http://purl.org/dc/elements/1.1/"/>
-    <ds:schemaRef ds:uri="http://purl.org/dc/terms/"/>
-    <ds:schemaRef ds:uri="http://schemas.microsoft.com/internal/obd"/>
-    <ds:schemaRef ds:uri="http://schemas.microsoft.com/office/2006/documentManagement/types"/>
-    <ds:schemaRef ds:uri="http://schemas.microsoft.com/office/2006/metadata/contentType"/>
-    <ds:schemaRef ds:uri="http://schemas.microsoft.com/office/2006/metadata/properties"/>
-    <ds:schemaRef ds:uri="http://schemas.microsoft.com/office/2006/metadata/properties/metaAttributes"/>
-    <ds:schemaRef ds:uri="http://schemas.microsoft.com/office/infopath/2007/PartnerControls"/>
-    <ds:schemaRef ds:uri="http://schemas.microsoft.com/sharepoint.v3"/>
-    <ds:schemaRef ds:uri="http://schemas.microsoft.com/sharepoint/v3"/>
-    <ds:schemaRef ds:uri="http://schemas.microsoft.com/sharepoint/v3/fields"/>
-    <ds:schemaRef ds:uri="http://schemas.openxmlformats.org/package/2006/metadata/core-properties"/>
-    <ds:schemaRef ds:uri="http://www.w3.org/2001/XMLSchema"/>
-  </ds:schemaRefs>
-</ds:datastoreItem>
-</file>
-
-<file path=customXml/itemProps3.xml><?xml version="1.0" encoding="utf-8"?>
-<ds:datastoreItem xmlns:ds="http://schemas.openxmlformats.org/officeDocument/2006/customXml" ds:itemID="{56B508E7-632F-46DC-BEB4-3727DC3FD51D}">
-  <ds:schemaRefs>
-    <ds:schemaRef ds:uri="4ffa91fb-a0ff-4ac5-b2db-65c790d184a4"/>
-    <ds:schemaRef ds:uri="8f0ccb0b-2b45-4ecf-807d-d8fd9145fac4"/>
-    <ds:schemaRef ds:uri="c3fe2bc6-81ec-4aad-a296-b74ae9f31a66"/>
-    <ds:schemaRef ds:uri="http://purl.org/dc/dcmitype/"/>
-    <ds:schemaRef ds:uri="http://purl.org/dc/elements/1.1/"/>
-    <ds:schemaRef ds:uri="http://purl.org/dc/terms/"/>
-    <ds:schemaRef ds:uri="http://schemas.microsoft.com/office/2006/documentManagement/types"/>
-    <ds:schemaRef ds:uri="http://schemas.microsoft.com/office/2006/metadata/properties"/>
-    <ds:schemaRef ds:uri="http://schemas.microsoft.com/office/infopath/2007/PartnerControls"/>
-    <ds:schemaRef ds:uri="http://schemas.microsoft.com/sharepoint.v3"/>
-    <ds:schemaRef ds:uri="http://schemas.microsoft.com/sharepoint/v3"/>
-    <ds:schemaRef ds:uri="http://schemas.microsoft.com/sharepoint/v3/fields"/>
-    <ds:schemaRef ds:uri="http://schemas.openxmlformats.org/package/2006/metadata/core-properties"/>
-    <ds:schemaRef ds:uri="http://www.w3.org/XML/1998/namespace"/>
-  </ds:schemaRefs>
-</ds:datastoreItem>
-</file>
-
 <file path=customXml/itemProps4.xml><?xml version="1.0" encoding="utf-8"?>
-<ds:datastoreItem xmlns:ds="http://schemas.openxmlformats.org/officeDocument/2006/customXml" ds:itemID="{3C7E442D-67AE-4E47-A991-4E464A95F37B}">
-  <ds:schemaRefs>
-    <ds:schemaRef ds:uri="Microsoft.SharePoint.Taxonomy.ContentTypeSync"/>
-  </ds:schemaRefs>
-</ds:datastoreItem>
+<ds:datastoreItem xmlns:ds="http://schemas.openxmlformats.org/officeDocument/2006/customXml" ds:itemID="{206B5337-00F9-41BC-AA3A-2D0738BABA5A}"/>
 </file>
</xml_diff>